<commit_message>
adding logistic regression :construction:
</commit_message>
<xml_diff>
--- a/presentation/pptx/02-Classification_methods.pptx
+++ b/presentation/pptx/02-Classification_methods.pptx
@@ -5,12 +5,16 @@
     <p:sldMasterId id="2147483840" r:id="rId1"/>
   </p:sldMasterIdLst>
   <p:notesMasterIdLst>
-    <p:notesMasterId r:id="rId5"/>
+    <p:notesMasterId r:id="rId9"/>
   </p:notesMasterIdLst>
   <p:sldIdLst>
     <p:sldId id="256" r:id="rId2"/>
     <p:sldId id="258" r:id="rId3"/>
     <p:sldId id="259" r:id="rId4"/>
+    <p:sldId id="260" r:id="rId5"/>
+    <p:sldId id="261" r:id="rId6"/>
+    <p:sldId id="262" r:id="rId7"/>
+    <p:sldId id="263" r:id="rId8"/>
   </p:sldIdLst>
   <p:sldSz cx="12192000" cy="6858000"/>
   <p:notesSz cx="6858000" cy="9144000"/>
@@ -122,7 +126,7 @@
             <a:srgbClr val="A4A3A4"/>
           </p15:clr>
         </p15:guide>
-        <p15:guide id="3" orient="horz" pos="3748" userDrawn="1">
+        <p15:guide id="3" orient="horz" pos="3770" userDrawn="1">
           <p15:clr>
             <a:srgbClr val="A4A3A4"/>
           </p15:clr>
@@ -215,7 +219,7 @@
           <a:p>
             <a:fld id="{5C93CA8F-50F8-44B5-B48F-4C4452AC4FCB}" type="datetimeFigureOut">
               <a:rPr lang="he-IL" smtClean="0"/>
-              <a:t>י"ט/תמוז/תשע"ט</a:t>
+              <a:t>כ'/תמוז/תשע"ט</a:t>
             </a:fld>
             <a:endParaRPr lang="he-IL"/>
           </a:p>
@@ -558,6 +562,90 @@
     <p:extLst>
       <p:ext uri="{BB962C8B-B14F-4D97-AF65-F5344CB8AC3E}">
         <p14:creationId xmlns:p14="http://schemas.microsoft.com/office/powerpoint/2010/main" val="2749990652"/>
+      </p:ext>
+    </p:extLst>
+  </p:cSld>
+  <p:clrMapOvr>
+    <a:masterClrMapping/>
+  </p:clrMapOvr>
+</p:notes>
+</file>
+
+<file path=ppt/notesSlides/notesSlide2.xml><?xml version="1.0" encoding="utf-8"?>
+<p:notes xmlns:a="http://schemas.openxmlformats.org/drawingml/2006/main" xmlns:r="http://schemas.openxmlformats.org/officeDocument/2006/relationships" xmlns:p="http://schemas.openxmlformats.org/presentationml/2006/main">
+  <p:cSld>
+    <p:spTree>
+      <p:nvGrpSpPr>
+        <p:cNvPr id="1" name=""/>
+        <p:cNvGrpSpPr/>
+        <p:nvPr/>
+      </p:nvGrpSpPr>
+      <p:grpSpPr>
+        <a:xfrm>
+          <a:off x="0" y="0"/>
+          <a:ext cx="0" cy="0"/>
+          <a:chOff x="0" y="0"/>
+          <a:chExt cx="0" cy="0"/>
+        </a:xfrm>
+      </p:grpSpPr>
+      <p:sp>
+        <p:nvSpPr>
+          <p:cNvPr id="2" name="Slide Image Placeholder 1"/>
+          <p:cNvSpPr>
+            <a:spLocks noGrp="1" noRot="1" noChangeAspect="1"/>
+          </p:cNvSpPr>
+          <p:nvPr>
+            <p:ph type="sldImg"/>
+          </p:nvPr>
+        </p:nvSpPr>
+        <p:spPr/>
+      </p:sp>
+      <p:sp>
+        <p:nvSpPr>
+          <p:cNvPr id="3" name="Notes Placeholder 2"/>
+          <p:cNvSpPr>
+            <a:spLocks noGrp="1"/>
+          </p:cNvSpPr>
+          <p:nvPr>
+            <p:ph type="body" idx="1"/>
+          </p:nvPr>
+        </p:nvSpPr>
+        <p:spPr/>
+        <p:txBody>
+          <a:bodyPr/>
+          <a:lstStyle/>
+          <a:p>
+            <a:endParaRPr lang="en-IL" dirty="0"/>
+          </a:p>
+        </p:txBody>
+      </p:sp>
+      <p:sp>
+        <p:nvSpPr>
+          <p:cNvPr id="4" name="Slide Number Placeholder 3"/>
+          <p:cNvSpPr>
+            <a:spLocks noGrp="1"/>
+          </p:cNvSpPr>
+          <p:nvPr>
+            <p:ph type="sldNum" sz="quarter" idx="5"/>
+          </p:nvPr>
+        </p:nvSpPr>
+        <p:spPr/>
+        <p:txBody>
+          <a:bodyPr/>
+          <a:lstStyle/>
+          <a:p>
+            <a:fld id="{C4276747-8356-4D8F-84BF-3C530C5DAF39}" type="slidenum">
+              <a:rPr lang="he-IL" smtClean="0"/>
+              <a:t>4</a:t>
+            </a:fld>
+            <a:endParaRPr lang="he-IL"/>
+          </a:p>
+        </p:txBody>
+      </p:sp>
+    </p:spTree>
+    <p:extLst>
+      <p:ext uri="{BB962C8B-B14F-4D97-AF65-F5344CB8AC3E}">
+        <p14:creationId xmlns:p14="http://schemas.microsoft.com/office/powerpoint/2010/main" val="4124184011"/>
       </p:ext>
     </p:extLst>
   </p:cSld>
@@ -4770,7 +4858,7 @@
           <a:p>
             <a:pPr rtl="0"/>
             <a:r>
-              <a:rPr lang="en-US" dirty="0" smtClean="0"/>
+              <a:rPr lang="en-US" dirty="0"/>
               <a:t>Classification Methods</a:t>
             </a:r>
             <a:endParaRPr lang="he-IL" dirty="0"/>
@@ -4869,23 +4957,18 @@
           <a:lstStyle/>
           <a:p>
             <a:r>
-              <a:rPr lang="en-US" dirty="0" smtClean="0"/>
+              <a:rPr lang="en-US" dirty="0"/>
               <a:t>It is only when they go wrong that machines remind you how powerful they are.</a:t>
             </a:r>
+          </a:p>
+          <a:p>
             <a:endParaRPr lang="en-US" dirty="0"/>
           </a:p>
           <a:p>
-            <a:endParaRPr lang="en-US" dirty="0"/>
-          </a:p>
-          <a:p>
             <a:pPr algn="r"/>
             <a:r>
               <a:rPr lang="en-US" dirty="0"/>
-              <a:t>- </a:t>
-            </a:r>
-            <a:r>
-              <a:rPr lang="en-US" dirty="0" smtClean="0"/>
-              <a:t>Clive James</a:t>
+              <a:t>- Clive James</a:t>
             </a:r>
             <a:endParaRPr lang="he-IL" dirty="0"/>
           </a:p>
@@ -4940,11 +5023,7 @@
           <a:p>
             <a:r>
               <a:rPr lang="en-US" dirty="0"/>
-              <a:t>Contents for </a:t>
-            </a:r>
-            <a:r>
-              <a:rPr lang="en-US" dirty="0" smtClean="0"/>
-              <a:t>today</a:t>
+              <a:t>Contents for today</a:t>
             </a:r>
             <a:endParaRPr lang="he-IL" dirty="0"/>
           </a:p>
@@ -5516,7 +5595,7 @@
           <a:p>
             <a:pPr algn="ctr"/>
             <a:r>
-              <a:rPr lang="en-US" dirty="0" smtClean="0"/>
+              <a:rPr lang="en-US" dirty="0"/>
               <a:t>Linear methods</a:t>
             </a:r>
             <a:endParaRPr lang="he-IL" dirty="0"/>
@@ -5558,7 +5637,7 @@
           <a:p>
             <a:pPr algn="ctr"/>
             <a:r>
-              <a:rPr lang="en-US" dirty="0" smtClean="0"/>
+              <a:rPr lang="en-US" dirty="0"/>
               <a:t>Logistic regression</a:t>
             </a:r>
             <a:endParaRPr lang="he-IL" dirty="0"/>
@@ -5600,7 +5679,7 @@
           <a:p>
             <a:pPr algn="ctr"/>
             <a:r>
-              <a:rPr lang="en-US" dirty="0" smtClean="0"/>
+              <a:rPr lang="en-US" dirty="0"/>
               <a:t>Discriminant Analysis</a:t>
             </a:r>
             <a:endParaRPr lang="he-IL" dirty="0"/>
@@ -5642,14 +5721,14 @@
           <a:p>
             <a:pPr algn="ctr"/>
             <a:r>
-              <a:rPr lang="en-US" dirty="0" smtClean="0"/>
+              <a:rPr lang="en-US" dirty="0"/>
               <a:t>Linear</a:t>
             </a:r>
             <a:br>
-              <a:rPr lang="en-US" dirty="0" smtClean="0"/>
+              <a:rPr lang="en-US" dirty="0"/>
             </a:br>
             <a:r>
-              <a:rPr lang="en-US" dirty="0" smtClean="0"/>
+              <a:rPr lang="en-US" dirty="0"/>
               <a:t>(LDA)</a:t>
             </a:r>
             <a:endParaRPr lang="he-IL" dirty="0"/>
@@ -5691,7 +5770,7 @@
           <a:p>
             <a:pPr algn="ctr"/>
             <a:r>
-              <a:rPr lang="en-US" dirty="0" smtClean="0"/>
+              <a:rPr lang="en-US" dirty="0"/>
               <a:t>Quadratic (QDA)</a:t>
             </a:r>
             <a:endParaRPr lang="he-IL" dirty="0"/>
@@ -5733,7 +5812,7 @@
           <a:p>
             <a:pPr algn="ctr"/>
             <a:r>
-              <a:rPr lang="en-US" dirty="0" smtClean="0"/>
+              <a:rPr lang="en-US" dirty="0"/>
               <a:t>Support Vector Machines (SVM)</a:t>
             </a:r>
             <a:endParaRPr lang="he-IL" dirty="0"/>
@@ -6047,7 +6126,7 @@
           <a:p>
             <a:r>
               <a:rPr lang="en-US" dirty="0"/>
-              <a:t>Our goal</a:t>
+              <a:t>Background</a:t>
             </a:r>
             <a:endParaRPr lang="he-IL" dirty="0"/>
           </a:p>
@@ -6072,8 +6151,13 @@
               </a:bodyPr>
               <a:lstStyle/>
               <a:p>
+                <a:pPr>
+                  <a:lnSpc>
+                    <a:spcPct val="150000"/>
+                  </a:lnSpc>
+                </a:pPr>
                 <a:r>
-                  <a:rPr lang="en-US" dirty="0" smtClean="0"/>
+                  <a:rPr lang="en-US" dirty="0"/>
                   <a:t>Given data </a:t>
                 </a:r>
                 <a:r>
@@ -6085,49 +6169,61 @@
                   <a:t> (matrix) with independent </a:t>
                 </a:r>
                 <a:r>
-                  <a:rPr lang="en-US" b="1" dirty="0" smtClean="0"/>
+                  <a:rPr lang="en-US" b="1" dirty="0"/>
                   <a:t>categorical </a:t>
                 </a:r>
                 <a:r>
-                  <a:rPr lang="en-US" dirty="0" smtClean="0"/>
+                  <a:rPr lang="en-US" dirty="0"/>
                   <a:t>result </a:t>
                 </a:r>
                 <a:r>
-                  <a:rPr lang="en-US" i="1" dirty="0" smtClean="0"/>
+                  <a:rPr lang="en-US" i="1" dirty="0"/>
                   <a:t>Y</a:t>
                 </a:r>
               </a:p>
               <a:p>
+                <a:pPr>
+                  <a:lnSpc>
+                    <a:spcPct val="150000"/>
+                  </a:lnSpc>
+                </a:pPr>
                 <a:r>
-                  <a:rPr lang="en-US" i="1" dirty="0" smtClean="0"/>
+                  <a:rPr lang="en-US" i="1" dirty="0"/>
                   <a:t>Y </a:t>
                 </a:r>
                 <a:r>
-                  <a:rPr lang="en-US" dirty="0" smtClean="0"/>
+                  <a:rPr lang="en-US" dirty="0"/>
                   <a:t>can be a 0-1; T-F; or even multiple level variable</a:t>
                 </a:r>
+              </a:p>
+              <a:p>
+                <a:pPr>
+                  <a:lnSpc>
+                    <a:spcPct val="150000"/>
+                  </a:lnSpc>
+                </a:pPr>
+                <a:r>
+                  <a:rPr lang="en-US" dirty="0"/>
+                  <a:t>Find a prediction to </a:t>
+                </a:r>
+                <a:r>
+                  <a:rPr lang="en-US" i="1" dirty="0"/>
+                  <a:t>Y</a:t>
+                </a:r>
+                <a:r>
+                  <a:rPr lang="en-US" dirty="0"/>
+                  <a:t> or formally, find:</a:t>
+                </a:r>
+                <a:br>
+                  <a:rPr lang="en-US" dirty="0"/>
+                </a:br>
                 <a:endParaRPr lang="en-US" dirty="0"/>
               </a:p>
               <a:p>
-                <a:r>
-                  <a:rPr lang="en-US" dirty="0" smtClean="0"/>
-                  <a:t>Find a prediction to </a:t>
-                </a:r>
-                <a:r>
-                  <a:rPr lang="en-US" i="1" dirty="0" smtClean="0"/>
-                  <a:t>Y</a:t>
-                </a:r>
-                <a:r>
-                  <a:rPr lang="en-US" dirty="0" smtClean="0"/>
-                  <a:t> or formally, find:</a:t>
-                </a:r>
-                <a:br>
-                  <a:rPr lang="en-US" dirty="0" smtClean="0"/>
-                </a:br>
-                <a:endParaRPr lang="en-US" dirty="0" smtClean="0"/>
-              </a:p>
-              <a:p>
                 <a:pPr marL="0" indent="0" algn="ctr">
+                  <a:lnSpc>
+                    <a:spcPct val="150000"/>
+                  </a:lnSpc>
                   <a:buNone/>
                 </a:pPr>
                 <a14:m>
@@ -6237,17 +6333,239 @@
                 <a:endParaRPr lang="en-US" i="1" dirty="0"/>
               </a:p>
               <a:p>
+                <a:pPr marL="0" indent="0">
+                  <a:lnSpc>
+                    <a:spcPct val="150000"/>
+                  </a:lnSpc>
+                  <a:buNone/>
+                </a:pPr>
                 <a:r>
-                  <a:rPr lang="en-US" dirty="0" smtClean="0"/>
-                  <a:t>How </a:t>
+                  <a:rPr lang="en-US" dirty="0"/>
+                  <a:t>Or more generally that </a:t>
+                </a:r>
+                <a:r>
+                  <a:rPr lang="en-US" i="1" dirty="0"/>
+                  <a:t>Y</a:t>
                 </a:r>
                 <a:r>
                   <a:rPr lang="en-US" dirty="0"/>
-                  <a:t>do we measure accuracy</a:t>
+                  <a:t> is of a certain type, i.e., </a:t>
                 </a:r>
+                <a14:m>
+                  <m:oMath xmlns:m="http://schemas.openxmlformats.org/officeDocument/2006/math">
+                    <m:r>
+                      <m:rPr>
+                        <m:sty m:val="p"/>
+                      </m:rPr>
+                      <a:rPr lang="en-US" b="0" i="0" smtClean="0">
+                        <a:latin typeface="Cambria Math" panose="02040503050406030204" pitchFamily="18" charset="0"/>
+                      </a:rPr>
+                      <m:t>Pr</m:t>
+                    </m:r>
+                    <m:r>
+                      <a:rPr lang="en-US" b="0" i="1" smtClean="0">
+                        <a:latin typeface="Cambria Math" panose="02040503050406030204" pitchFamily="18" charset="0"/>
+                      </a:rPr>
+                      <m:t>⁡(</m:t>
+                    </m:r>
+                    <m:r>
+                      <a:rPr lang="en-US" b="0" i="1" smtClean="0">
+                        <a:latin typeface="Cambria Math" panose="02040503050406030204" pitchFamily="18" charset="0"/>
+                      </a:rPr>
+                      <m:t>𝑌</m:t>
+                    </m:r>
+                    <m:r>
+                      <a:rPr lang="en-US" b="0" i="1" smtClean="0">
+                        <a:latin typeface="Cambria Math" panose="02040503050406030204" pitchFamily="18" charset="0"/>
+                      </a:rPr>
+                      <m:t>∈</m:t>
+                    </m:r>
+                    <m:r>
+                      <m:rPr>
+                        <m:lit/>
+                      </m:rPr>
+                      <a:rPr lang="en-US" b="0" i="1" smtClean="0">
+                        <a:latin typeface="Cambria Math" panose="02040503050406030204" pitchFamily="18" charset="0"/>
+                      </a:rPr>
+                      <m:t>{</m:t>
+                    </m:r>
+                    <m:sSub>
+                      <m:sSubPr>
+                        <m:ctrlPr>
+                          <a:rPr lang="en-US" b="0" i="1" smtClean="0">
+                            <a:latin typeface="Cambria Math" panose="02040503050406030204" pitchFamily="18" charset="0"/>
+                          </a:rPr>
+                        </m:ctrlPr>
+                      </m:sSubPr>
+                      <m:e>
+                        <m:r>
+                          <a:rPr lang="en-US" b="0" i="1" smtClean="0">
+                            <a:latin typeface="Cambria Math" panose="02040503050406030204" pitchFamily="18" charset="0"/>
+                          </a:rPr>
+                          <m:t>𝑣</m:t>
+                        </m:r>
+                      </m:e>
+                      <m:sub>
+                        <m:r>
+                          <a:rPr lang="en-US" b="0" i="1" smtClean="0">
+                            <a:latin typeface="Cambria Math" panose="02040503050406030204" pitchFamily="18" charset="0"/>
+                          </a:rPr>
+                          <m:t>𝑖</m:t>
+                        </m:r>
+                      </m:sub>
+                    </m:sSub>
+                    <m:r>
+                      <a:rPr lang="en-US" b="0" i="1" smtClean="0">
+                        <a:latin typeface="Cambria Math" panose="02040503050406030204" pitchFamily="18" charset="0"/>
+                      </a:rPr>
+                      <m:t>,</m:t>
+                    </m:r>
+                    <m:sSub>
+                      <m:sSubPr>
+                        <m:ctrlPr>
+                          <a:rPr lang="en-US" b="0" i="1" smtClean="0">
+                            <a:latin typeface="Cambria Math" panose="02040503050406030204" pitchFamily="18" charset="0"/>
+                          </a:rPr>
+                        </m:ctrlPr>
+                      </m:sSubPr>
+                      <m:e>
+                        <m:r>
+                          <a:rPr lang="en-US" b="0" i="1" smtClean="0">
+                            <a:latin typeface="Cambria Math" panose="02040503050406030204" pitchFamily="18" charset="0"/>
+                          </a:rPr>
+                          <m:t>𝑣</m:t>
+                        </m:r>
+                      </m:e>
+                      <m:sub>
+                        <m:r>
+                          <a:rPr lang="en-US" b="0" i="1" smtClean="0">
+                            <a:latin typeface="Cambria Math" panose="02040503050406030204" pitchFamily="18" charset="0"/>
+                          </a:rPr>
+                          <m:t>𝑗</m:t>
+                        </m:r>
+                      </m:sub>
+                    </m:sSub>
+                    <m:r>
+                      <a:rPr lang="en-US" b="0" i="1" smtClean="0">
+                        <a:latin typeface="Cambria Math" panose="02040503050406030204" pitchFamily="18" charset="0"/>
+                      </a:rPr>
+                      <m:t>,…</m:t>
+                    </m:r>
+                    <m:r>
+                      <m:rPr>
+                        <m:lit/>
+                      </m:rPr>
+                      <a:rPr lang="en-US" b="0" i="1" smtClean="0">
+                        <a:latin typeface="Cambria Math" panose="02040503050406030204" pitchFamily="18" charset="0"/>
+                      </a:rPr>
+                      <m:t>}</m:t>
+                    </m:r>
+                    <m:r>
+                      <a:rPr lang="en-US" b="0" i="1" smtClean="0">
+                        <a:latin typeface="Cambria Math" panose="02040503050406030204" pitchFamily="18" charset="0"/>
+                      </a:rPr>
+                      <m:t>|</m:t>
+                    </m:r>
+                    <m:r>
+                      <a:rPr lang="en-US" b="0" i="1" smtClean="0">
+                        <a:latin typeface="Cambria Math" panose="02040503050406030204" pitchFamily="18" charset="0"/>
+                      </a:rPr>
+                      <m:t>𝑋</m:t>
+                    </m:r>
+                    <m:r>
+                      <a:rPr lang="en-US" b="0" i="1" smtClean="0">
+                        <a:latin typeface="Cambria Math" panose="02040503050406030204" pitchFamily="18" charset="0"/>
+                      </a:rPr>
+                      <m:t>=</m:t>
+                    </m:r>
+                    <m:sSub>
+                      <m:sSubPr>
+                        <m:ctrlPr>
+                          <a:rPr lang="en-US" b="0" i="1" smtClean="0">
+                            <a:latin typeface="Cambria Math" panose="02040503050406030204" pitchFamily="18" charset="0"/>
+                          </a:rPr>
+                        </m:ctrlPr>
+                      </m:sSubPr>
+                      <m:e>
+                        <m:r>
+                          <a:rPr lang="en-US" b="0" i="1" smtClean="0">
+                            <a:latin typeface="Cambria Math" panose="02040503050406030204" pitchFamily="18" charset="0"/>
+                          </a:rPr>
+                          <m:t>𝑥</m:t>
+                        </m:r>
+                      </m:e>
+                      <m:sub>
+                        <m:r>
+                          <a:rPr lang="en-US" b="0" i="1" smtClean="0">
+                            <a:latin typeface="Cambria Math" panose="02040503050406030204" pitchFamily="18" charset="0"/>
+                          </a:rPr>
+                          <m:t>0</m:t>
+                        </m:r>
+                      </m:sub>
+                    </m:sSub>
+                    <m:r>
+                      <a:rPr lang="en-US" b="0" i="1" smtClean="0">
+                        <a:latin typeface="Cambria Math" panose="02040503050406030204" pitchFamily="18" charset="0"/>
+                      </a:rPr>
+                      <m:t>)</m:t>
+                    </m:r>
+                  </m:oMath>
+                </a14:m>
+                <a:endParaRPr lang="en-US" dirty="0"/>
+              </a:p>
+              <a:p>
+                <a:pPr>
+                  <a:lnSpc>
+                    <a:spcPct val="150000"/>
+                  </a:lnSpc>
+                </a:pPr>
                 <a:r>
-                  <a:rPr lang="en-US" dirty="0" smtClean="0"/>
-                  <a:t>?</a:t>
+                  <a:rPr lang="en-US" dirty="0"/>
+                  <a:t>Probability is in </a:t>
+                </a:r>
+                <a14:m>
+                  <m:oMath xmlns:m="http://schemas.openxmlformats.org/officeDocument/2006/math">
+                    <m:r>
+                      <m:rPr>
+                        <m:lit/>
+                      </m:rPr>
+                      <a:rPr lang="en-US" b="0" i="1" smtClean="0">
+                        <a:latin typeface="Cambria Math" panose="02040503050406030204" pitchFamily="18" charset="0"/>
+                      </a:rPr>
+                      <m:t>[</m:t>
+                    </m:r>
+                    <m:r>
+                      <a:rPr lang="en-US" b="0" i="1" smtClean="0">
+                        <a:latin typeface="Cambria Math" panose="02040503050406030204" pitchFamily="18" charset="0"/>
+                      </a:rPr>
+                      <m:t>0</m:t>
+                    </m:r>
+                    <m:r>
+                      <a:rPr lang="en-US" b="0" i="1" smtClean="0">
+                        <a:latin typeface="Cambria Math" panose="02040503050406030204" pitchFamily="18" charset="0"/>
+                      </a:rPr>
+                      <m:t>,</m:t>
+                    </m:r>
+                    <m:r>
+                      <a:rPr lang="en-US" b="0" i="1" smtClean="0">
+                        <a:latin typeface="Cambria Math" panose="02040503050406030204" pitchFamily="18" charset="0"/>
+                      </a:rPr>
+                      <m:t>1</m:t>
+                    </m:r>
+                    <m:r>
+                      <m:rPr>
+                        <m:lit/>
+                      </m:rPr>
+                      <a:rPr lang="en-US" b="0" i="1" smtClean="0">
+                        <a:latin typeface="Cambria Math" panose="02040503050406030204" pitchFamily="18" charset="0"/>
+                      </a:rPr>
+                      <m:t>]</m:t>
+                    </m:r>
+                  </m:oMath>
+                </a14:m>
+                <a:r>
+                  <a:rPr lang="en-US" dirty="0"/>
+                  <a:t>, hence, linear regression does not capture its range</a:t>
                 </a:r>
               </a:p>
             </p:txBody>
@@ -6268,7 +6586,7 @@
               <a:blipFill>
                 <a:blip r:embed="rId3"/>
                 <a:stretch>
-                  <a:fillRect l="-303" t="-1504"/>
+                  <a:fillRect l="-667"/>
                 </a:stretch>
               </a:blipFill>
             </p:spPr>
@@ -6277,7 +6595,7 @@
               <a:lstStyle/>
               <a:p>
                 <a:r>
-                  <a:rPr lang="he-IL">
+                  <a:rPr lang="en-IL">
                     <a:noFill/>
                   </a:rPr>
                   <a:t> </a:t>
@@ -6337,6 +6655,2411 @@
     <p:extLst>
       <p:ext uri="{BB962C8B-B14F-4D97-AF65-F5344CB8AC3E}">
         <p14:creationId xmlns:p14="http://schemas.microsoft.com/office/powerpoint/2010/main" val="2997200712"/>
+      </p:ext>
+    </p:extLst>
+  </p:cSld>
+  <p:clrMapOvr>
+    <a:masterClrMapping/>
+  </p:clrMapOvr>
+</p:sld>
+</file>
+
+<file path=ppt/slides/slide4.xml><?xml version="1.0" encoding="utf-8"?>
+<p:sld xmlns:a="http://schemas.openxmlformats.org/drawingml/2006/main" xmlns:r="http://schemas.openxmlformats.org/officeDocument/2006/relationships" xmlns:p="http://schemas.openxmlformats.org/presentationml/2006/main">
+  <p:cSld>
+    <p:spTree>
+      <p:nvGrpSpPr>
+        <p:cNvPr id="1" name=""/>
+        <p:cNvGrpSpPr/>
+        <p:nvPr/>
+      </p:nvGrpSpPr>
+      <p:grpSpPr>
+        <a:xfrm>
+          <a:off x="0" y="0"/>
+          <a:ext cx="0" cy="0"/>
+          <a:chOff x="0" y="0"/>
+          <a:chExt cx="0" cy="0"/>
+        </a:xfrm>
+      </p:grpSpPr>
+      <p:sp>
+        <p:nvSpPr>
+          <p:cNvPr id="2" name="Title 1">
+            <a:extLst>
+              <a:ext uri="{FF2B5EF4-FFF2-40B4-BE49-F238E27FC236}">
+                <a16:creationId xmlns:a16="http://schemas.microsoft.com/office/drawing/2014/main" id="{FD270FC6-4FC2-4723-AB64-BFCE6A80AF3B}"/>
+              </a:ext>
+            </a:extLst>
+          </p:cNvPr>
+          <p:cNvSpPr>
+            <a:spLocks noGrp="1"/>
+          </p:cNvSpPr>
+          <p:nvPr>
+            <p:ph type="title"/>
+          </p:nvPr>
+        </p:nvSpPr>
+        <p:spPr/>
+        <p:txBody>
+          <a:bodyPr>
+            <a:normAutofit/>
+          </a:bodyPr>
+          <a:lstStyle/>
+          <a:p>
+            <a:r>
+              <a:rPr lang="en-US" dirty="0"/>
+              <a:t>Classification accuracy</a:t>
+            </a:r>
+            <a:endParaRPr lang="en-IL" dirty="0"/>
+          </a:p>
+        </p:txBody>
+      </p:sp>
+      <p:sp>
+        <p:nvSpPr>
+          <p:cNvPr id="3" name="Content Placeholder 2">
+            <a:extLst>
+              <a:ext uri="{FF2B5EF4-FFF2-40B4-BE49-F238E27FC236}">
+                <a16:creationId xmlns:a16="http://schemas.microsoft.com/office/drawing/2014/main" id="{6D4EEBF2-7280-4121-9C49-E9B7CE724EFA}"/>
+              </a:ext>
+            </a:extLst>
+          </p:cNvPr>
+          <p:cNvSpPr>
+            <a:spLocks noGrp="1"/>
+          </p:cNvSpPr>
+          <p:nvPr>
+            <p:ph idx="1"/>
+          </p:nvPr>
+        </p:nvSpPr>
+        <p:spPr/>
+        <p:txBody>
+          <a:bodyPr/>
+          <a:lstStyle/>
+          <a:p>
+            <a:r>
+              <a:rPr lang="en-US" dirty="0"/>
+              <a:t>How would we measure accuracy?</a:t>
+            </a:r>
+          </a:p>
+          <a:p>
+            <a:pPr lvl="1"/>
+            <a:r>
+              <a:rPr lang="en-US" b="1" dirty="0"/>
+              <a:t>Objective</a:t>
+            </a:r>
+            <a:r>
+              <a:rPr lang="en-US" dirty="0"/>
+              <a:t>: e.g., likelihood function, vs.:</a:t>
+            </a:r>
+          </a:p>
+          <a:p>
+            <a:pPr lvl="1"/>
+            <a:r>
+              <a:rPr lang="en-US" b="1" dirty="0"/>
+              <a:t>Performance</a:t>
+            </a:r>
+            <a:r>
+              <a:rPr lang="en-US" dirty="0"/>
+              <a:t>: e.g., Confusion matrix (misclassification), ROC, AUC,…</a:t>
+            </a:r>
+          </a:p>
+        </p:txBody>
+      </p:sp>
+      <p:sp>
+        <p:nvSpPr>
+          <p:cNvPr id="4" name="Footer Placeholder 3">
+            <a:extLst>
+              <a:ext uri="{FF2B5EF4-FFF2-40B4-BE49-F238E27FC236}">
+                <a16:creationId xmlns:a16="http://schemas.microsoft.com/office/drawing/2014/main" id="{FBD7ED92-3794-4CC6-8A43-D54896C7E25C}"/>
+              </a:ext>
+            </a:extLst>
+          </p:cNvPr>
+          <p:cNvSpPr>
+            <a:spLocks noGrp="1"/>
+          </p:cNvSpPr>
+          <p:nvPr>
+            <p:ph type="ftr" sz="quarter" idx="11"/>
+          </p:nvPr>
+        </p:nvSpPr>
+        <p:spPr/>
+        <p:txBody>
+          <a:bodyPr/>
+          <a:lstStyle/>
+          <a:p>
+            <a:r>
+              <a:rPr lang="en-US"/>
+              <a:t>Materials by Adi Sarid https://adisarid.github.io and http://www.sarid-ins.com</a:t>
+            </a:r>
+            <a:endParaRPr lang="en-US" dirty="0"/>
+          </a:p>
+        </p:txBody>
+      </p:sp>
+      <p:sp>
+        <p:nvSpPr>
+          <p:cNvPr id="5" name="Slide Number Placeholder 4">
+            <a:extLst>
+              <a:ext uri="{FF2B5EF4-FFF2-40B4-BE49-F238E27FC236}">
+                <a16:creationId xmlns:a16="http://schemas.microsoft.com/office/drawing/2014/main" id="{C4225519-DE70-4828-B305-D0CFBE57378B}"/>
+              </a:ext>
+            </a:extLst>
+          </p:cNvPr>
+          <p:cNvSpPr>
+            <a:spLocks noGrp="1"/>
+          </p:cNvSpPr>
+          <p:nvPr>
+            <p:ph type="sldNum" sz="quarter" idx="12"/>
+          </p:nvPr>
+        </p:nvSpPr>
+        <p:spPr/>
+        <p:txBody>
+          <a:bodyPr/>
+          <a:lstStyle/>
+          <a:p>
+            <a:fld id="{4FAB73BC-B049-4115-A692-8D63A059BFB8}" type="slidenum">
+              <a:rPr lang="en-US" smtClean="0"/>
+              <a:t>4</a:t>
+            </a:fld>
+            <a:endParaRPr lang="en-US" dirty="0"/>
+          </a:p>
+        </p:txBody>
+      </p:sp>
+      <p:grpSp>
+        <p:nvGrpSpPr>
+          <p:cNvPr id="20" name="Group 19">
+            <a:extLst>
+              <a:ext uri="{FF2B5EF4-FFF2-40B4-BE49-F238E27FC236}">
+                <a16:creationId xmlns:a16="http://schemas.microsoft.com/office/drawing/2014/main" id="{0EEF9060-C30B-40DE-A7CE-67DAAEADD72F}"/>
+              </a:ext>
+            </a:extLst>
+          </p:cNvPr>
+          <p:cNvGrpSpPr/>
+          <p:nvPr/>
+        </p:nvGrpSpPr>
+        <p:grpSpPr>
+          <a:xfrm>
+            <a:off x="2681959" y="3515934"/>
+            <a:ext cx="2913321" cy="2468941"/>
+            <a:chOff x="1626784" y="3515934"/>
+            <a:chExt cx="2913321" cy="2468941"/>
+          </a:xfrm>
+        </p:grpSpPr>
+        <p:sp>
+          <p:nvSpPr>
+            <p:cNvPr id="14" name="Rectangle: Rounded Corners 13">
+              <a:extLst>
+                <a:ext uri="{FF2B5EF4-FFF2-40B4-BE49-F238E27FC236}">
+                  <a16:creationId xmlns:a16="http://schemas.microsoft.com/office/drawing/2014/main" id="{BE0C4EBD-B652-4DA8-8EF4-57A49E1E07A0}"/>
+                </a:ext>
+              </a:extLst>
+            </p:cNvPr>
+            <p:cNvSpPr/>
+            <p:nvPr/>
+          </p:nvSpPr>
+          <p:spPr>
+            <a:xfrm>
+              <a:off x="1626784" y="3515934"/>
+              <a:ext cx="2913321" cy="2468941"/>
+            </a:xfrm>
+            <a:prstGeom prst="roundRect">
+              <a:avLst>
+                <a:gd name="adj" fmla="val 5040"/>
+              </a:avLst>
+            </a:prstGeom>
+          </p:spPr>
+          <p:style>
+            <a:lnRef idx="2">
+              <a:schemeClr val="dk1"/>
+            </a:lnRef>
+            <a:fillRef idx="1">
+              <a:schemeClr val="lt1"/>
+            </a:fillRef>
+            <a:effectRef idx="0">
+              <a:schemeClr val="dk1"/>
+            </a:effectRef>
+            <a:fontRef idx="minor">
+              <a:schemeClr val="dk1"/>
+            </a:fontRef>
+          </p:style>
+          <p:txBody>
+            <a:bodyPr rtlCol="0" anchor="ctr"/>
+            <a:lstStyle/>
+            <a:p>
+              <a:pPr algn="ctr"/>
+              <a:endParaRPr lang="en-IL"/>
+            </a:p>
+          </p:txBody>
+        </p:sp>
+        <p:sp>
+          <p:nvSpPr>
+            <p:cNvPr id="6" name="Rectangle: Rounded Corners 5">
+              <a:extLst>
+                <a:ext uri="{FF2B5EF4-FFF2-40B4-BE49-F238E27FC236}">
+                  <a16:creationId xmlns:a16="http://schemas.microsoft.com/office/drawing/2014/main" id="{982D13D4-C487-4A5D-A334-4E0D552D684F}"/>
+                </a:ext>
+              </a:extLst>
+            </p:cNvPr>
+            <p:cNvSpPr/>
+            <p:nvPr/>
+          </p:nvSpPr>
+          <p:spPr>
+            <a:xfrm>
+              <a:off x="2215614" y="3611631"/>
+              <a:ext cx="1814126" cy="598856"/>
+            </a:xfrm>
+            <a:prstGeom prst="roundRect">
+              <a:avLst/>
+            </a:prstGeom>
+          </p:spPr>
+          <p:style>
+            <a:lnRef idx="2">
+              <a:schemeClr val="accent2">
+                <a:shade val="50000"/>
+              </a:schemeClr>
+            </a:lnRef>
+            <a:fillRef idx="1">
+              <a:schemeClr val="accent2"/>
+            </a:fillRef>
+            <a:effectRef idx="0">
+              <a:schemeClr val="accent2"/>
+            </a:effectRef>
+            <a:fontRef idx="minor">
+              <a:schemeClr val="lt1"/>
+            </a:fontRef>
+          </p:style>
+          <p:txBody>
+            <a:bodyPr rtlCol="0" anchor="ctr"/>
+            <a:lstStyle/>
+            <a:p>
+              <a:pPr algn="ctr"/>
+              <a:r>
+                <a:rPr lang="en-US" dirty="0"/>
+                <a:t>Objective</a:t>
+              </a:r>
+            </a:p>
+          </p:txBody>
+        </p:sp>
+        <p:sp>
+          <p:nvSpPr>
+            <p:cNvPr id="8" name="Rectangle: Rounded Corners 7">
+              <a:extLst>
+                <a:ext uri="{FF2B5EF4-FFF2-40B4-BE49-F238E27FC236}">
+                  <a16:creationId xmlns:a16="http://schemas.microsoft.com/office/drawing/2014/main" id="{7DEE4BE8-9DDA-4F25-ADE1-DBA6B0204D4B}"/>
+                </a:ext>
+              </a:extLst>
+            </p:cNvPr>
+            <p:cNvSpPr/>
+            <p:nvPr/>
+          </p:nvSpPr>
+          <p:spPr>
+            <a:xfrm>
+              <a:off x="1765005" y="4325810"/>
+              <a:ext cx="1212111" cy="416391"/>
+            </a:xfrm>
+            <a:prstGeom prst="roundRect">
+              <a:avLst/>
+            </a:prstGeom>
+          </p:spPr>
+          <p:style>
+            <a:lnRef idx="2">
+              <a:schemeClr val="accent1"/>
+            </a:lnRef>
+            <a:fillRef idx="1">
+              <a:schemeClr val="lt1"/>
+            </a:fillRef>
+            <a:effectRef idx="0">
+              <a:schemeClr val="accent1"/>
+            </a:effectRef>
+            <a:fontRef idx="minor">
+              <a:schemeClr val="dk1"/>
+            </a:fontRef>
+          </p:style>
+          <p:txBody>
+            <a:bodyPr rtlCol="0" anchor="ctr"/>
+            <a:lstStyle/>
+            <a:p>
+              <a:pPr algn="ctr"/>
+              <a:r>
+                <a:rPr lang="en-US" sz="1600" dirty="0"/>
+                <a:t>Entropy</a:t>
+              </a:r>
+              <a:endParaRPr lang="en-IL" sz="1600" dirty="0"/>
+            </a:p>
+          </p:txBody>
+        </p:sp>
+        <p:sp>
+          <p:nvSpPr>
+            <p:cNvPr id="9" name="Rectangle: Rounded Corners 8">
+              <a:extLst>
+                <a:ext uri="{FF2B5EF4-FFF2-40B4-BE49-F238E27FC236}">
+                  <a16:creationId xmlns:a16="http://schemas.microsoft.com/office/drawing/2014/main" id="{D3380F29-292B-4E12-BA4B-069E858BB621}"/>
+                </a:ext>
+              </a:extLst>
+            </p:cNvPr>
+            <p:cNvSpPr/>
+            <p:nvPr/>
+          </p:nvSpPr>
+          <p:spPr>
+            <a:xfrm>
+              <a:off x="1765005" y="4875992"/>
+              <a:ext cx="1212111" cy="416391"/>
+            </a:xfrm>
+            <a:prstGeom prst="roundRect">
+              <a:avLst/>
+            </a:prstGeom>
+          </p:spPr>
+          <p:style>
+            <a:lnRef idx="2">
+              <a:schemeClr val="accent1"/>
+            </a:lnRef>
+            <a:fillRef idx="1">
+              <a:schemeClr val="lt1"/>
+            </a:fillRef>
+            <a:effectRef idx="0">
+              <a:schemeClr val="accent1"/>
+            </a:effectRef>
+            <a:fontRef idx="minor">
+              <a:schemeClr val="dk1"/>
+            </a:fontRef>
+          </p:style>
+          <p:txBody>
+            <a:bodyPr rtlCol="0" anchor="ctr"/>
+            <a:lstStyle/>
+            <a:p>
+              <a:pPr algn="ctr"/>
+              <a:r>
+                <a:rPr lang="en-US" sz="1600" dirty="0"/>
+                <a:t>Gini</a:t>
+              </a:r>
+              <a:endParaRPr lang="en-IL" sz="1600" dirty="0"/>
+            </a:p>
+          </p:txBody>
+        </p:sp>
+        <p:sp>
+          <p:nvSpPr>
+            <p:cNvPr id="10" name="Rectangle: Rounded Corners 9">
+              <a:extLst>
+                <a:ext uri="{FF2B5EF4-FFF2-40B4-BE49-F238E27FC236}">
+                  <a16:creationId xmlns:a16="http://schemas.microsoft.com/office/drawing/2014/main" id="{33388C11-8F8D-4334-8FD3-66CCBCA73441}"/>
+                </a:ext>
+              </a:extLst>
+            </p:cNvPr>
+            <p:cNvSpPr/>
+            <p:nvPr/>
+          </p:nvSpPr>
+          <p:spPr>
+            <a:xfrm>
+              <a:off x="3186473" y="4325810"/>
+              <a:ext cx="1212111" cy="416391"/>
+            </a:xfrm>
+            <a:prstGeom prst="roundRect">
+              <a:avLst/>
+            </a:prstGeom>
+          </p:spPr>
+          <p:style>
+            <a:lnRef idx="2">
+              <a:schemeClr val="accent1">
+                <a:shade val="50000"/>
+              </a:schemeClr>
+            </a:lnRef>
+            <a:fillRef idx="1">
+              <a:schemeClr val="accent1"/>
+            </a:fillRef>
+            <a:effectRef idx="0">
+              <a:schemeClr val="accent1"/>
+            </a:effectRef>
+            <a:fontRef idx="minor">
+              <a:schemeClr val="lt1"/>
+            </a:fontRef>
+          </p:style>
+          <p:txBody>
+            <a:bodyPr rtlCol="0" anchor="ctr"/>
+            <a:lstStyle/>
+            <a:p>
+              <a:pPr algn="ctr"/>
+              <a:r>
+                <a:rPr lang="en-US" sz="1400" dirty="0"/>
+                <a:t>Likelihood</a:t>
+              </a:r>
+              <a:endParaRPr lang="en-IL" sz="1400" dirty="0"/>
+            </a:p>
+          </p:txBody>
+        </p:sp>
+        <p:sp>
+          <p:nvSpPr>
+            <p:cNvPr id="11" name="Rectangle: Rounded Corners 10">
+              <a:extLst>
+                <a:ext uri="{FF2B5EF4-FFF2-40B4-BE49-F238E27FC236}">
+                  <a16:creationId xmlns:a16="http://schemas.microsoft.com/office/drawing/2014/main" id="{13D220F6-A550-4B51-9138-46397987E472}"/>
+                </a:ext>
+              </a:extLst>
+            </p:cNvPr>
+            <p:cNvSpPr/>
+            <p:nvPr/>
+          </p:nvSpPr>
+          <p:spPr>
+            <a:xfrm>
+              <a:off x="3186473" y="4875992"/>
+              <a:ext cx="1212111" cy="416391"/>
+            </a:xfrm>
+            <a:prstGeom prst="roundRect">
+              <a:avLst/>
+            </a:prstGeom>
+          </p:spPr>
+          <p:style>
+            <a:lnRef idx="2">
+              <a:schemeClr val="accent1">
+                <a:shade val="50000"/>
+              </a:schemeClr>
+            </a:lnRef>
+            <a:fillRef idx="1">
+              <a:schemeClr val="accent1"/>
+            </a:fillRef>
+            <a:effectRef idx="0">
+              <a:schemeClr val="accent1"/>
+            </a:effectRef>
+            <a:fontRef idx="minor">
+              <a:schemeClr val="lt1"/>
+            </a:fontRef>
+          </p:style>
+          <p:txBody>
+            <a:bodyPr rtlCol="0" anchor="ctr"/>
+            <a:lstStyle/>
+            <a:p>
+              <a:pPr algn="ctr"/>
+              <a:r>
+                <a:rPr lang="en-US" sz="1600" dirty="0"/>
+                <a:t>Bayes</a:t>
+              </a:r>
+              <a:endParaRPr lang="en-IL" sz="1600" dirty="0"/>
+            </a:p>
+          </p:txBody>
+        </p:sp>
+        <p:sp>
+          <p:nvSpPr>
+            <p:cNvPr id="12" name="Rectangle: Rounded Corners 11">
+              <a:extLst>
+                <a:ext uri="{FF2B5EF4-FFF2-40B4-BE49-F238E27FC236}">
+                  <a16:creationId xmlns:a16="http://schemas.microsoft.com/office/drawing/2014/main" id="{B360B6BF-3CC5-48F3-8A54-095EA6DB9B22}"/>
+                </a:ext>
+              </a:extLst>
+            </p:cNvPr>
+            <p:cNvSpPr/>
+            <p:nvPr/>
+          </p:nvSpPr>
+          <p:spPr>
+            <a:xfrm>
+              <a:off x="1765005" y="5426174"/>
+              <a:ext cx="1212111" cy="401817"/>
+            </a:xfrm>
+            <a:prstGeom prst="roundRect">
+              <a:avLst/>
+            </a:prstGeom>
+          </p:spPr>
+          <p:style>
+            <a:lnRef idx="2">
+              <a:schemeClr val="accent1">
+                <a:shade val="50000"/>
+              </a:schemeClr>
+            </a:lnRef>
+            <a:fillRef idx="1">
+              <a:schemeClr val="accent1"/>
+            </a:fillRef>
+            <a:effectRef idx="0">
+              <a:schemeClr val="accent1"/>
+            </a:effectRef>
+            <a:fontRef idx="minor">
+              <a:schemeClr val="lt1"/>
+            </a:fontRef>
+          </p:style>
+          <p:txBody>
+            <a:bodyPr rtlCol="0" anchor="ctr"/>
+            <a:lstStyle/>
+            <a:p>
+              <a:pPr algn="ctr"/>
+              <a:r>
+                <a:rPr lang="en-US" sz="1200" dirty="0"/>
+                <a:t>Separator Margin</a:t>
+              </a:r>
+              <a:endParaRPr lang="en-IL" sz="1200" dirty="0"/>
+            </a:p>
+          </p:txBody>
+        </p:sp>
+        <p:sp>
+          <p:nvSpPr>
+            <p:cNvPr id="13" name="Rectangle: Rounded Corners 12">
+              <a:extLst>
+                <a:ext uri="{FF2B5EF4-FFF2-40B4-BE49-F238E27FC236}">
+                  <a16:creationId xmlns:a16="http://schemas.microsoft.com/office/drawing/2014/main" id="{3FD8D218-FE2D-47B7-9F24-51C540245C52}"/>
+                </a:ext>
+              </a:extLst>
+            </p:cNvPr>
+            <p:cNvSpPr/>
+            <p:nvPr/>
+          </p:nvSpPr>
+          <p:spPr>
+            <a:xfrm>
+              <a:off x="3186473" y="5411601"/>
+              <a:ext cx="1212111" cy="416391"/>
+            </a:xfrm>
+            <a:prstGeom prst="roundRect">
+              <a:avLst/>
+            </a:prstGeom>
+          </p:spPr>
+          <p:style>
+            <a:lnRef idx="2">
+              <a:schemeClr val="accent1"/>
+            </a:lnRef>
+            <a:fillRef idx="1">
+              <a:schemeClr val="lt1"/>
+            </a:fillRef>
+            <a:effectRef idx="0">
+              <a:schemeClr val="accent1"/>
+            </a:effectRef>
+            <a:fontRef idx="minor">
+              <a:schemeClr val="dk1"/>
+            </a:fontRef>
+          </p:style>
+          <p:txBody>
+            <a:bodyPr rtlCol="0" anchor="ctr"/>
+            <a:lstStyle/>
+            <a:p>
+              <a:pPr algn="ctr"/>
+              <a:r>
+                <a:rPr lang="en-US" sz="1600" dirty="0"/>
+                <a:t>…</a:t>
+              </a:r>
+              <a:endParaRPr lang="en-IL" sz="1600" dirty="0"/>
+            </a:p>
+          </p:txBody>
+        </p:sp>
+      </p:grpSp>
+      <p:grpSp>
+        <p:nvGrpSpPr>
+          <p:cNvPr id="21" name="Group 20">
+            <a:extLst>
+              <a:ext uri="{FF2B5EF4-FFF2-40B4-BE49-F238E27FC236}">
+                <a16:creationId xmlns:a16="http://schemas.microsoft.com/office/drawing/2014/main" id="{A4EE9021-E660-4ACE-A02E-EF37FCEC01D8}"/>
+              </a:ext>
+            </a:extLst>
+          </p:cNvPr>
+          <p:cNvGrpSpPr/>
+          <p:nvPr/>
+        </p:nvGrpSpPr>
+        <p:grpSpPr>
+          <a:xfrm>
+            <a:off x="6596720" y="3515934"/>
+            <a:ext cx="2913321" cy="2468941"/>
+            <a:chOff x="7548867" y="3515934"/>
+            <a:chExt cx="2913321" cy="2468941"/>
+          </a:xfrm>
+        </p:grpSpPr>
+        <p:sp>
+          <p:nvSpPr>
+            <p:cNvPr id="15" name="Rectangle: Rounded Corners 14">
+              <a:extLst>
+                <a:ext uri="{FF2B5EF4-FFF2-40B4-BE49-F238E27FC236}">
+                  <a16:creationId xmlns:a16="http://schemas.microsoft.com/office/drawing/2014/main" id="{53F6CABE-6668-4F27-9F93-42E7ACBE976D}"/>
+                </a:ext>
+              </a:extLst>
+            </p:cNvPr>
+            <p:cNvSpPr/>
+            <p:nvPr/>
+          </p:nvSpPr>
+          <p:spPr>
+            <a:xfrm>
+              <a:off x="7548867" y="3515934"/>
+              <a:ext cx="2913321" cy="2468941"/>
+            </a:xfrm>
+            <a:prstGeom prst="roundRect">
+              <a:avLst>
+                <a:gd name="adj" fmla="val 5040"/>
+              </a:avLst>
+            </a:prstGeom>
+          </p:spPr>
+          <p:style>
+            <a:lnRef idx="2">
+              <a:schemeClr val="dk1"/>
+            </a:lnRef>
+            <a:fillRef idx="1">
+              <a:schemeClr val="lt1"/>
+            </a:fillRef>
+            <a:effectRef idx="0">
+              <a:schemeClr val="dk1"/>
+            </a:effectRef>
+            <a:fontRef idx="minor">
+              <a:schemeClr val="dk1"/>
+            </a:fontRef>
+          </p:style>
+          <p:txBody>
+            <a:bodyPr rtlCol="0" anchor="ctr"/>
+            <a:lstStyle/>
+            <a:p>
+              <a:pPr algn="ctr"/>
+              <a:endParaRPr lang="en-IL"/>
+            </a:p>
+          </p:txBody>
+        </p:sp>
+        <p:sp>
+          <p:nvSpPr>
+            <p:cNvPr id="7" name="Rectangle: Rounded Corners 6">
+              <a:extLst>
+                <a:ext uri="{FF2B5EF4-FFF2-40B4-BE49-F238E27FC236}">
+                  <a16:creationId xmlns:a16="http://schemas.microsoft.com/office/drawing/2014/main" id="{168FD5A4-535C-4897-8CF5-4DEDEAAAF2A8}"/>
+                </a:ext>
+              </a:extLst>
+            </p:cNvPr>
+            <p:cNvSpPr/>
+            <p:nvPr/>
+          </p:nvSpPr>
+          <p:spPr>
+            <a:xfrm>
+              <a:off x="8098465" y="3611631"/>
+              <a:ext cx="1814126" cy="598856"/>
+            </a:xfrm>
+            <a:prstGeom prst="roundRect">
+              <a:avLst/>
+            </a:prstGeom>
+          </p:spPr>
+          <p:style>
+            <a:lnRef idx="2">
+              <a:schemeClr val="accent2">
+                <a:shade val="50000"/>
+              </a:schemeClr>
+            </a:lnRef>
+            <a:fillRef idx="1">
+              <a:schemeClr val="accent2"/>
+            </a:fillRef>
+            <a:effectRef idx="0">
+              <a:schemeClr val="accent2"/>
+            </a:effectRef>
+            <a:fontRef idx="minor">
+              <a:schemeClr val="lt1"/>
+            </a:fontRef>
+          </p:style>
+          <p:txBody>
+            <a:bodyPr rtlCol="0" anchor="ctr"/>
+            <a:lstStyle/>
+            <a:p>
+              <a:pPr algn="ctr"/>
+              <a:r>
+                <a:rPr lang="en-US" dirty="0"/>
+                <a:t>Performance</a:t>
+              </a:r>
+            </a:p>
+          </p:txBody>
+        </p:sp>
+        <p:sp>
+          <p:nvSpPr>
+            <p:cNvPr id="16" name="Rectangle: Rounded Corners 15">
+              <a:extLst>
+                <a:ext uri="{FF2B5EF4-FFF2-40B4-BE49-F238E27FC236}">
+                  <a16:creationId xmlns:a16="http://schemas.microsoft.com/office/drawing/2014/main" id="{78F763AB-1634-4EA3-BB03-F67F7A40EC48}"/>
+                </a:ext>
+              </a:extLst>
+            </p:cNvPr>
+            <p:cNvSpPr/>
+            <p:nvPr/>
+          </p:nvSpPr>
+          <p:spPr>
+            <a:xfrm>
+              <a:off x="7734692" y="4325810"/>
+              <a:ext cx="1212111" cy="416391"/>
+            </a:xfrm>
+            <a:prstGeom prst="roundRect">
+              <a:avLst/>
+            </a:prstGeom>
+          </p:spPr>
+          <p:style>
+            <a:lnRef idx="2">
+              <a:schemeClr val="accent1">
+                <a:shade val="50000"/>
+              </a:schemeClr>
+            </a:lnRef>
+            <a:fillRef idx="1">
+              <a:schemeClr val="accent1"/>
+            </a:fillRef>
+            <a:effectRef idx="0">
+              <a:schemeClr val="accent1"/>
+            </a:effectRef>
+            <a:fontRef idx="minor">
+              <a:schemeClr val="lt1"/>
+            </a:fontRef>
+          </p:style>
+          <p:txBody>
+            <a:bodyPr rtlCol="0" anchor="ctr"/>
+            <a:lstStyle/>
+            <a:p>
+              <a:pPr algn="ctr"/>
+              <a:r>
+                <a:rPr lang="en-US" sz="1600" dirty="0"/>
+                <a:t>Type-I</a:t>
+              </a:r>
+              <a:endParaRPr lang="en-IL" sz="1600" dirty="0"/>
+            </a:p>
+          </p:txBody>
+        </p:sp>
+        <p:sp>
+          <p:nvSpPr>
+            <p:cNvPr id="17" name="Rectangle: Rounded Corners 16">
+              <a:extLst>
+                <a:ext uri="{FF2B5EF4-FFF2-40B4-BE49-F238E27FC236}">
+                  <a16:creationId xmlns:a16="http://schemas.microsoft.com/office/drawing/2014/main" id="{1FDA49A1-C413-49D7-8B6F-EB6EE1DB0240}"/>
+                </a:ext>
+              </a:extLst>
+            </p:cNvPr>
+            <p:cNvSpPr/>
+            <p:nvPr/>
+          </p:nvSpPr>
+          <p:spPr>
+            <a:xfrm>
+              <a:off x="7734691" y="4888374"/>
+              <a:ext cx="1212111" cy="416391"/>
+            </a:xfrm>
+            <a:prstGeom prst="roundRect">
+              <a:avLst/>
+            </a:prstGeom>
+          </p:spPr>
+          <p:style>
+            <a:lnRef idx="2">
+              <a:schemeClr val="accent1">
+                <a:shade val="50000"/>
+              </a:schemeClr>
+            </a:lnRef>
+            <a:fillRef idx="1">
+              <a:schemeClr val="accent1"/>
+            </a:fillRef>
+            <a:effectRef idx="0">
+              <a:schemeClr val="accent1"/>
+            </a:effectRef>
+            <a:fontRef idx="minor">
+              <a:schemeClr val="lt1"/>
+            </a:fontRef>
+          </p:style>
+          <p:txBody>
+            <a:bodyPr rtlCol="0" anchor="ctr"/>
+            <a:lstStyle/>
+            <a:p>
+              <a:pPr algn="ctr"/>
+              <a:r>
+                <a:rPr lang="en-US" sz="1400" dirty="0"/>
+                <a:t>Type-II</a:t>
+              </a:r>
+              <a:endParaRPr lang="en-IL" sz="1400" dirty="0"/>
+            </a:p>
+          </p:txBody>
+        </p:sp>
+        <p:sp>
+          <p:nvSpPr>
+            <p:cNvPr id="18" name="Rectangle: Rounded Corners 17">
+              <a:extLst>
+                <a:ext uri="{FF2B5EF4-FFF2-40B4-BE49-F238E27FC236}">
+                  <a16:creationId xmlns:a16="http://schemas.microsoft.com/office/drawing/2014/main" id="{29A98133-2B93-40D4-AF35-702C62E6CF51}"/>
+                </a:ext>
+              </a:extLst>
+            </p:cNvPr>
+            <p:cNvSpPr/>
+            <p:nvPr/>
+          </p:nvSpPr>
+          <p:spPr>
+            <a:xfrm>
+              <a:off x="9114389" y="4329241"/>
+              <a:ext cx="1212111" cy="416391"/>
+            </a:xfrm>
+            <a:prstGeom prst="roundRect">
+              <a:avLst/>
+            </a:prstGeom>
+          </p:spPr>
+          <p:style>
+            <a:lnRef idx="2">
+              <a:schemeClr val="accent1">
+                <a:shade val="50000"/>
+              </a:schemeClr>
+            </a:lnRef>
+            <a:fillRef idx="1">
+              <a:schemeClr val="accent1"/>
+            </a:fillRef>
+            <a:effectRef idx="0">
+              <a:schemeClr val="accent1"/>
+            </a:effectRef>
+            <a:fontRef idx="minor">
+              <a:schemeClr val="lt1"/>
+            </a:fontRef>
+          </p:style>
+          <p:txBody>
+            <a:bodyPr rtlCol="0" anchor="ctr"/>
+            <a:lstStyle/>
+            <a:p>
+              <a:pPr algn="ctr"/>
+              <a:r>
+                <a:rPr lang="en-US" sz="1600" dirty="0"/>
+                <a:t>ROC</a:t>
+              </a:r>
+              <a:endParaRPr lang="en-IL" sz="1600" dirty="0"/>
+            </a:p>
+          </p:txBody>
+        </p:sp>
+        <p:sp>
+          <p:nvSpPr>
+            <p:cNvPr id="19" name="Rectangle: Rounded Corners 18">
+              <a:extLst>
+                <a:ext uri="{FF2B5EF4-FFF2-40B4-BE49-F238E27FC236}">
+                  <a16:creationId xmlns:a16="http://schemas.microsoft.com/office/drawing/2014/main" id="{368EBC21-5758-483B-93A5-5DF3A008596E}"/>
+                </a:ext>
+              </a:extLst>
+            </p:cNvPr>
+            <p:cNvSpPr/>
+            <p:nvPr/>
+          </p:nvSpPr>
+          <p:spPr>
+            <a:xfrm>
+              <a:off x="9114389" y="4875991"/>
+              <a:ext cx="1212111" cy="416391"/>
+            </a:xfrm>
+            <a:prstGeom prst="roundRect">
+              <a:avLst/>
+            </a:prstGeom>
+          </p:spPr>
+          <p:style>
+            <a:lnRef idx="2">
+              <a:schemeClr val="accent1">
+                <a:shade val="50000"/>
+              </a:schemeClr>
+            </a:lnRef>
+            <a:fillRef idx="1">
+              <a:schemeClr val="accent1"/>
+            </a:fillRef>
+            <a:effectRef idx="0">
+              <a:schemeClr val="accent1"/>
+            </a:effectRef>
+            <a:fontRef idx="minor">
+              <a:schemeClr val="lt1"/>
+            </a:fontRef>
+          </p:style>
+          <p:txBody>
+            <a:bodyPr rtlCol="0" anchor="ctr"/>
+            <a:lstStyle/>
+            <a:p>
+              <a:pPr algn="ctr"/>
+              <a:r>
+                <a:rPr lang="en-US" sz="1600" dirty="0"/>
+                <a:t>AUC</a:t>
+              </a:r>
+              <a:endParaRPr lang="en-IL" sz="1600" dirty="0"/>
+            </a:p>
+          </p:txBody>
+        </p:sp>
+        <p:sp>
+          <p:nvSpPr>
+            <p:cNvPr id="24" name="Rectangle: Rounded Corners 23">
+              <a:extLst>
+                <a:ext uri="{FF2B5EF4-FFF2-40B4-BE49-F238E27FC236}">
+                  <a16:creationId xmlns:a16="http://schemas.microsoft.com/office/drawing/2014/main" id="{902DB25E-0656-4561-BC64-9F6E47DC9C95}"/>
+                </a:ext>
+              </a:extLst>
+            </p:cNvPr>
+            <p:cNvSpPr/>
+            <p:nvPr/>
+          </p:nvSpPr>
+          <p:spPr>
+            <a:xfrm>
+              <a:off x="7734691" y="5426174"/>
+              <a:ext cx="1212111" cy="416391"/>
+            </a:xfrm>
+            <a:prstGeom prst="roundRect">
+              <a:avLst/>
+            </a:prstGeom>
+          </p:spPr>
+          <p:style>
+            <a:lnRef idx="2">
+              <a:schemeClr val="accent1">
+                <a:shade val="50000"/>
+              </a:schemeClr>
+            </a:lnRef>
+            <a:fillRef idx="1">
+              <a:schemeClr val="accent1"/>
+            </a:fillRef>
+            <a:effectRef idx="0">
+              <a:schemeClr val="accent1"/>
+            </a:effectRef>
+            <a:fontRef idx="minor">
+              <a:schemeClr val="lt1"/>
+            </a:fontRef>
+          </p:style>
+          <p:txBody>
+            <a:bodyPr rtlCol="0" anchor="ctr"/>
+            <a:lstStyle/>
+            <a:p>
+              <a:pPr algn="ctr"/>
+              <a:r>
+                <a:rPr lang="en-US" sz="1200" dirty="0"/>
+                <a:t>Operational Implications</a:t>
+              </a:r>
+              <a:endParaRPr lang="en-IL" sz="1200" dirty="0"/>
+            </a:p>
+          </p:txBody>
+        </p:sp>
+        <p:sp>
+          <p:nvSpPr>
+            <p:cNvPr id="25" name="Rectangle: Rounded Corners 24">
+              <a:extLst>
+                <a:ext uri="{FF2B5EF4-FFF2-40B4-BE49-F238E27FC236}">
+                  <a16:creationId xmlns:a16="http://schemas.microsoft.com/office/drawing/2014/main" id="{FB0ADBA9-DCAE-4135-BC21-1AE85B4668D3}"/>
+                </a:ext>
+              </a:extLst>
+            </p:cNvPr>
+            <p:cNvSpPr/>
+            <p:nvPr/>
+          </p:nvSpPr>
+          <p:spPr>
+            <a:xfrm>
+              <a:off x="9114389" y="5411600"/>
+              <a:ext cx="1212111" cy="416391"/>
+            </a:xfrm>
+            <a:prstGeom prst="roundRect">
+              <a:avLst/>
+            </a:prstGeom>
+          </p:spPr>
+          <p:style>
+            <a:lnRef idx="2">
+              <a:schemeClr val="accent1"/>
+            </a:lnRef>
+            <a:fillRef idx="1">
+              <a:schemeClr val="lt1"/>
+            </a:fillRef>
+            <a:effectRef idx="0">
+              <a:schemeClr val="accent1"/>
+            </a:effectRef>
+            <a:fontRef idx="minor">
+              <a:schemeClr val="dk1"/>
+            </a:fontRef>
+          </p:style>
+          <p:txBody>
+            <a:bodyPr rtlCol="0" anchor="ctr"/>
+            <a:lstStyle/>
+            <a:p>
+              <a:pPr algn="ctr"/>
+              <a:r>
+                <a:rPr lang="en-US" sz="1600" dirty="0"/>
+                <a:t>…</a:t>
+              </a:r>
+              <a:endParaRPr lang="en-IL" sz="1600" dirty="0"/>
+            </a:p>
+          </p:txBody>
+        </p:sp>
+      </p:grpSp>
+      <p:grpSp>
+        <p:nvGrpSpPr>
+          <p:cNvPr id="26" name="Group 25">
+            <a:extLst>
+              <a:ext uri="{FF2B5EF4-FFF2-40B4-BE49-F238E27FC236}">
+                <a16:creationId xmlns:a16="http://schemas.microsoft.com/office/drawing/2014/main" id="{2CD12819-25BD-4DEE-B7AF-DD4442AE1857}"/>
+              </a:ext>
+            </a:extLst>
+          </p:cNvPr>
+          <p:cNvGrpSpPr/>
+          <p:nvPr/>
+        </p:nvGrpSpPr>
+        <p:grpSpPr>
+          <a:xfrm>
+            <a:off x="7071887" y="6132097"/>
+            <a:ext cx="4164810" cy="584775"/>
+            <a:chOff x="8235728" y="342051"/>
+            <a:chExt cx="4164810" cy="584775"/>
+          </a:xfrm>
+        </p:grpSpPr>
+        <p:pic>
+          <p:nvPicPr>
+            <p:cNvPr id="22" name="Picture 21">
+              <a:hlinkClick r:id="rId3"/>
+              <a:extLst>
+                <a:ext uri="{FF2B5EF4-FFF2-40B4-BE49-F238E27FC236}">
+                  <a16:creationId xmlns:a16="http://schemas.microsoft.com/office/drawing/2014/main" id="{DB58D866-C1C8-46C0-8AC0-0119F1B826E7}"/>
+                </a:ext>
+              </a:extLst>
+            </p:cNvPr>
+            <p:cNvPicPr>
+              <a:picLocks noChangeAspect="1"/>
+            </p:cNvPicPr>
+            <p:nvPr/>
+          </p:nvPicPr>
+          <p:blipFill rotWithShape="1">
+            <a:blip r:embed="rId4"/>
+            <a:srcRect l="16061" t="18242" r="8788" b="16788"/>
+            <a:stretch/>
+          </p:blipFill>
+          <p:spPr>
+            <a:xfrm>
+              <a:off x="8235728" y="356980"/>
+              <a:ext cx="640080" cy="553359"/>
+            </a:xfrm>
+            <a:prstGeom prst="rect">
+              <a:avLst/>
+            </a:prstGeom>
+          </p:spPr>
+        </p:pic>
+        <p:sp>
+          <p:nvSpPr>
+            <p:cNvPr id="23" name="TextBox 22">
+              <a:extLst>
+                <a:ext uri="{FF2B5EF4-FFF2-40B4-BE49-F238E27FC236}">
+                  <a16:creationId xmlns:a16="http://schemas.microsoft.com/office/drawing/2014/main" id="{CA017EAA-0246-48A0-80A4-30764F645462}"/>
+                </a:ext>
+              </a:extLst>
+            </p:cNvPr>
+            <p:cNvSpPr txBox="1"/>
+            <p:nvPr/>
+          </p:nvSpPr>
+          <p:spPr>
+            <a:xfrm>
+              <a:off x="8931580" y="342051"/>
+              <a:ext cx="3468958" cy="584775"/>
+            </a:xfrm>
+            <a:prstGeom prst="rect">
+              <a:avLst/>
+            </a:prstGeom>
+            <a:noFill/>
+          </p:spPr>
+          <p:txBody>
+            <a:bodyPr wrap="square" rtlCol="0">
+              <a:spAutoFit/>
+            </a:bodyPr>
+            <a:lstStyle/>
+            <a:p>
+              <a:r>
+                <a:rPr lang="en-US" sz="1600" u="sng" dirty="0"/>
+                <a:t>Sanity check:</a:t>
+              </a:r>
+            </a:p>
+            <a:p>
+              <a:r>
+                <a:rPr lang="en-US" sz="1600" dirty="0"/>
+                <a:t>Objectives vs. performance in </a:t>
+              </a:r>
+              <a:r>
+                <a:rPr lang="en-US" sz="1600" i="1" dirty="0" err="1"/>
+                <a:t>lm</a:t>
+              </a:r>
+              <a:endParaRPr lang="en-IL" sz="1600" i="1" dirty="0"/>
+            </a:p>
+          </p:txBody>
+        </p:sp>
+      </p:grpSp>
+    </p:spTree>
+    <p:extLst>
+      <p:ext uri="{BB962C8B-B14F-4D97-AF65-F5344CB8AC3E}">
+        <p14:creationId xmlns:p14="http://schemas.microsoft.com/office/powerpoint/2010/main" val="1522669933"/>
+      </p:ext>
+    </p:extLst>
+  </p:cSld>
+  <p:clrMapOvr>
+    <a:masterClrMapping/>
+  </p:clrMapOvr>
+</p:sld>
+</file>
+
+<file path=ppt/slides/slide5.xml><?xml version="1.0" encoding="utf-8"?>
+<p:sld xmlns:a="http://schemas.openxmlformats.org/drawingml/2006/main" xmlns:r="http://schemas.openxmlformats.org/officeDocument/2006/relationships" xmlns:p="http://schemas.openxmlformats.org/presentationml/2006/main">
+  <p:cSld>
+    <p:spTree>
+      <p:nvGrpSpPr>
+        <p:cNvPr id="1" name=""/>
+        <p:cNvGrpSpPr/>
+        <p:nvPr/>
+      </p:nvGrpSpPr>
+      <p:grpSpPr>
+        <a:xfrm>
+          <a:off x="0" y="0"/>
+          <a:ext cx="0" cy="0"/>
+          <a:chOff x="0" y="0"/>
+          <a:chExt cx="0" cy="0"/>
+        </a:xfrm>
+      </p:grpSpPr>
+      <p:sp>
+        <p:nvSpPr>
+          <p:cNvPr id="2" name="Title 1">
+            <a:extLst>
+              <a:ext uri="{FF2B5EF4-FFF2-40B4-BE49-F238E27FC236}">
+                <a16:creationId xmlns:a16="http://schemas.microsoft.com/office/drawing/2014/main" id="{8EC1C32C-85A4-4E9C-8105-FB22F7740CB9}"/>
+              </a:ext>
+            </a:extLst>
+          </p:cNvPr>
+          <p:cNvSpPr>
+            <a:spLocks noGrp="1"/>
+          </p:cNvSpPr>
+          <p:nvPr>
+            <p:ph type="title"/>
+          </p:nvPr>
+        </p:nvSpPr>
+        <p:spPr/>
+        <p:txBody>
+          <a:bodyPr/>
+          <a:lstStyle/>
+          <a:p>
+            <a:r>
+              <a:rPr lang="en-US" dirty="0"/>
+              <a:t>Logistic regression and likelihood</a:t>
+            </a:r>
+            <a:endParaRPr lang="en-IL" dirty="0"/>
+          </a:p>
+        </p:txBody>
+      </p:sp>
+      <mc:AlternateContent xmlns:mc="http://schemas.openxmlformats.org/markup-compatibility/2006">
+        <mc:Choice xmlns:a14="http://schemas.microsoft.com/office/drawing/2010/main" Requires="a14">
+          <p:sp>
+            <p:nvSpPr>
+              <p:cNvPr id="3" name="Content Placeholder 2">
+                <a:extLst>
+                  <a:ext uri="{FF2B5EF4-FFF2-40B4-BE49-F238E27FC236}">
+                    <a16:creationId xmlns:a16="http://schemas.microsoft.com/office/drawing/2014/main" id="{9DA995B1-110C-4833-A2FC-F96DC7D5A703}"/>
+                  </a:ext>
+                </a:extLst>
+              </p:cNvPr>
+              <p:cNvSpPr>
+                <a:spLocks noGrp="1"/>
+              </p:cNvSpPr>
+              <p:nvPr>
+                <p:ph idx="1"/>
+              </p:nvPr>
+            </p:nvSpPr>
+            <p:spPr/>
+            <p:txBody>
+              <a:bodyPr>
+                <a:normAutofit fontScale="85000" lnSpcReduction="20000"/>
+              </a:bodyPr>
+              <a:lstStyle/>
+              <a:p>
+                <a:pPr>
+                  <a:lnSpc>
+                    <a:spcPct val="150000"/>
+                  </a:lnSpc>
+                </a:pPr>
+                <a:r>
+                  <a:rPr lang="en-US" dirty="0"/>
+                  <a:t>In logistic regression, we assume that the probability can be modeled as a function of a linear combination of </a:t>
+                </a:r>
+                <a:r>
+                  <a:rPr lang="en-US" i="1" dirty="0"/>
+                  <a:t>x</a:t>
+                </a:r>
+                <a:r>
+                  <a:rPr lang="en-US" dirty="0"/>
+                  <a:t>, i.e.:</a:t>
+                </a:r>
+              </a:p>
+              <a:p>
+                <a:pPr marL="0" indent="0" algn="ctr">
+                  <a:lnSpc>
+                    <a:spcPct val="150000"/>
+                  </a:lnSpc>
+                  <a:buNone/>
+                </a:pPr>
+                <a14:m>
+                  <m:oMathPara xmlns:m="http://schemas.openxmlformats.org/officeDocument/2006/math">
+                    <m:oMathParaPr>
+                      <m:jc m:val="centerGroup"/>
+                    </m:oMathParaPr>
+                    <m:oMath xmlns:m="http://schemas.openxmlformats.org/officeDocument/2006/math">
+                      <m:func>
+                        <m:funcPr>
+                          <m:ctrlPr>
+                            <a:rPr lang="en-US" b="0" i="1" smtClean="0">
+                              <a:latin typeface="Cambria Math" panose="02040503050406030204" pitchFamily="18" charset="0"/>
+                            </a:rPr>
+                          </m:ctrlPr>
+                        </m:funcPr>
+                        <m:fName>
+                          <m:r>
+                            <m:rPr>
+                              <m:sty m:val="p"/>
+                            </m:rPr>
+                            <a:rPr lang="en-US" b="0" i="0" smtClean="0">
+                              <a:latin typeface="Cambria Math" panose="02040503050406030204" pitchFamily="18" charset="0"/>
+                            </a:rPr>
+                            <m:t>Pr</m:t>
+                          </m:r>
+                        </m:fName>
+                        <m:e>
+                          <m:d>
+                            <m:dPr>
+                              <m:ctrlPr>
+                                <a:rPr lang="en-US" b="0" i="1" smtClean="0">
+                                  <a:latin typeface="Cambria Math" panose="02040503050406030204" pitchFamily="18" charset="0"/>
+                                </a:rPr>
+                              </m:ctrlPr>
+                            </m:dPr>
+                            <m:e>
+                              <m:r>
+                                <a:rPr lang="en-US" b="0" i="1" smtClean="0">
+                                  <a:latin typeface="Cambria Math" panose="02040503050406030204" pitchFamily="18" charset="0"/>
+                                </a:rPr>
+                                <m:t>𝑌</m:t>
+                              </m:r>
+                              <m:r>
+                                <a:rPr lang="en-US" b="0" i="1" smtClean="0">
+                                  <a:latin typeface="Cambria Math" panose="02040503050406030204" pitchFamily="18" charset="0"/>
+                                </a:rPr>
+                                <m:t>=</m:t>
+                              </m:r>
+                              <m:r>
+                                <a:rPr lang="en-US" b="0" i="1" smtClean="0">
+                                  <a:latin typeface="Cambria Math" panose="02040503050406030204" pitchFamily="18" charset="0"/>
+                                </a:rPr>
+                                <m:t>1</m:t>
+                              </m:r>
+                            </m:e>
+                            <m:e>
+                              <m:r>
+                                <a:rPr lang="en-US" b="0" i="1" smtClean="0">
+                                  <a:latin typeface="Cambria Math" panose="02040503050406030204" pitchFamily="18" charset="0"/>
+                                </a:rPr>
+                                <m:t>𝑋</m:t>
+                              </m:r>
+                              <m:r>
+                                <a:rPr lang="en-US" b="0" i="1" smtClean="0">
+                                  <a:latin typeface="Cambria Math" panose="02040503050406030204" pitchFamily="18" charset="0"/>
+                                </a:rPr>
+                                <m:t>=</m:t>
+                              </m:r>
+                              <m:r>
+                                <a:rPr lang="en-US" b="0" i="1" smtClean="0">
+                                  <a:latin typeface="Cambria Math" panose="02040503050406030204" pitchFamily="18" charset="0"/>
+                                </a:rPr>
+                                <m:t>𝑥</m:t>
+                              </m:r>
+                            </m:e>
+                          </m:d>
+                        </m:e>
+                      </m:func>
+                      <m:r>
+                        <a:rPr lang="en-US" b="0" i="1" smtClean="0">
+                          <a:latin typeface="Cambria Math" panose="02040503050406030204" pitchFamily="18" charset="0"/>
+                        </a:rPr>
+                        <m:t>=</m:t>
+                      </m:r>
+                      <m:f>
+                        <m:fPr>
+                          <m:ctrlPr>
+                            <a:rPr lang="en-US" b="0" i="1" smtClean="0">
+                              <a:latin typeface="Cambria Math" panose="02040503050406030204" pitchFamily="18" charset="0"/>
+                            </a:rPr>
+                          </m:ctrlPr>
+                        </m:fPr>
+                        <m:num>
+                          <m:sSup>
+                            <m:sSupPr>
+                              <m:ctrlPr>
+                                <a:rPr lang="en-US" b="0" i="1" smtClean="0">
+                                  <a:latin typeface="Cambria Math" panose="02040503050406030204" pitchFamily="18" charset="0"/>
+                                </a:rPr>
+                              </m:ctrlPr>
+                            </m:sSupPr>
+                            <m:e>
+                              <m:r>
+                                <a:rPr lang="en-US" b="0" i="1" smtClean="0">
+                                  <a:latin typeface="Cambria Math" panose="02040503050406030204" pitchFamily="18" charset="0"/>
+                                </a:rPr>
+                                <m:t>𝑒</m:t>
+                              </m:r>
+                            </m:e>
+                            <m:sup>
+                              <m:sSub>
+                                <m:sSubPr>
+                                  <m:ctrlPr>
+                                    <a:rPr lang="en-US" b="0" i="1" smtClean="0">
+                                      <a:latin typeface="Cambria Math" panose="02040503050406030204" pitchFamily="18" charset="0"/>
+                                    </a:rPr>
+                                  </m:ctrlPr>
+                                </m:sSubPr>
+                                <m:e>
+                                  <m:r>
+                                    <a:rPr lang="en-US" b="0" i="1" smtClean="0">
+                                      <a:latin typeface="Cambria Math" panose="02040503050406030204" pitchFamily="18" charset="0"/>
+                                    </a:rPr>
+                                    <m:t>𝛽</m:t>
+                                  </m:r>
+                                </m:e>
+                                <m:sub>
+                                  <m:r>
+                                    <a:rPr lang="en-US" b="0" i="1" smtClean="0">
+                                      <a:latin typeface="Cambria Math" panose="02040503050406030204" pitchFamily="18" charset="0"/>
+                                    </a:rPr>
+                                    <m:t>0</m:t>
+                                  </m:r>
+                                </m:sub>
+                              </m:sSub>
+                              <m:r>
+                                <a:rPr lang="en-US" b="0" i="1" smtClean="0">
+                                  <a:latin typeface="Cambria Math" panose="02040503050406030204" pitchFamily="18" charset="0"/>
+                                </a:rPr>
+                                <m:t>+</m:t>
+                              </m:r>
+                              <m:sSub>
+                                <m:sSubPr>
+                                  <m:ctrlPr>
+                                    <a:rPr lang="en-US" b="0" i="1" smtClean="0">
+                                      <a:latin typeface="Cambria Math" panose="02040503050406030204" pitchFamily="18" charset="0"/>
+                                    </a:rPr>
+                                  </m:ctrlPr>
+                                </m:sSubPr>
+                                <m:e>
+                                  <m:r>
+                                    <a:rPr lang="en-US" b="0" i="1" smtClean="0">
+                                      <a:latin typeface="Cambria Math" panose="02040503050406030204" pitchFamily="18" charset="0"/>
+                                    </a:rPr>
+                                    <m:t>𝛽</m:t>
+                                  </m:r>
+                                </m:e>
+                                <m:sub>
+                                  <m:r>
+                                    <a:rPr lang="en-US" b="0" i="1" smtClean="0">
+                                      <a:latin typeface="Cambria Math" panose="02040503050406030204" pitchFamily="18" charset="0"/>
+                                    </a:rPr>
+                                    <m:t>1</m:t>
+                                  </m:r>
+                                </m:sub>
+                              </m:sSub>
+                              <m:sSub>
+                                <m:sSubPr>
+                                  <m:ctrlPr>
+                                    <a:rPr lang="en-US" b="0" i="1" smtClean="0">
+                                      <a:latin typeface="Cambria Math" panose="02040503050406030204" pitchFamily="18" charset="0"/>
+                                    </a:rPr>
+                                  </m:ctrlPr>
+                                </m:sSubPr>
+                                <m:e>
+                                  <m:r>
+                                    <a:rPr lang="en-US" b="0" i="1" smtClean="0">
+                                      <a:latin typeface="Cambria Math" panose="02040503050406030204" pitchFamily="18" charset="0"/>
+                                    </a:rPr>
+                                    <m:t>𝑥</m:t>
+                                  </m:r>
+                                </m:e>
+                                <m:sub>
+                                  <m:r>
+                                    <a:rPr lang="en-US" b="0" i="1" smtClean="0">
+                                      <a:latin typeface="Cambria Math" panose="02040503050406030204" pitchFamily="18" charset="0"/>
+                                    </a:rPr>
+                                    <m:t>1</m:t>
+                                  </m:r>
+                                </m:sub>
+                              </m:sSub>
+                              <m:r>
+                                <a:rPr lang="en-US" b="0" i="1" smtClean="0">
+                                  <a:latin typeface="Cambria Math" panose="02040503050406030204" pitchFamily="18" charset="0"/>
+                                </a:rPr>
+                                <m:t>+…</m:t>
+                              </m:r>
+                            </m:sup>
+                          </m:sSup>
+                        </m:num>
+                        <m:den>
+                          <m:r>
+                            <a:rPr lang="en-US" b="0" i="1" smtClean="0">
+                              <a:latin typeface="Cambria Math" panose="02040503050406030204" pitchFamily="18" charset="0"/>
+                            </a:rPr>
+                            <m:t>1</m:t>
+                          </m:r>
+                          <m:r>
+                            <a:rPr lang="en-US" b="0" i="1" smtClean="0">
+                              <a:latin typeface="Cambria Math" panose="02040503050406030204" pitchFamily="18" charset="0"/>
+                            </a:rPr>
+                            <m:t>+</m:t>
+                          </m:r>
+                          <m:sSup>
+                            <m:sSupPr>
+                              <m:ctrlPr>
+                                <a:rPr lang="en-US" b="0" i="1" smtClean="0">
+                                  <a:latin typeface="Cambria Math" panose="02040503050406030204" pitchFamily="18" charset="0"/>
+                                </a:rPr>
+                              </m:ctrlPr>
+                            </m:sSupPr>
+                            <m:e>
+                              <m:r>
+                                <a:rPr lang="en-US" b="0" i="1" smtClean="0">
+                                  <a:latin typeface="Cambria Math" panose="02040503050406030204" pitchFamily="18" charset="0"/>
+                                </a:rPr>
+                                <m:t>𝑒</m:t>
+                              </m:r>
+                            </m:e>
+                            <m:sup>
+                              <m:sSub>
+                                <m:sSubPr>
+                                  <m:ctrlPr>
+                                    <a:rPr lang="en-US" b="0" i="1" smtClean="0">
+                                      <a:latin typeface="Cambria Math" panose="02040503050406030204" pitchFamily="18" charset="0"/>
+                                    </a:rPr>
+                                  </m:ctrlPr>
+                                </m:sSubPr>
+                                <m:e>
+                                  <m:r>
+                                    <a:rPr lang="en-US" b="0" i="1" smtClean="0">
+                                      <a:latin typeface="Cambria Math" panose="02040503050406030204" pitchFamily="18" charset="0"/>
+                                    </a:rPr>
+                                    <m:t>𝛽</m:t>
+                                  </m:r>
+                                </m:e>
+                                <m:sub>
+                                  <m:r>
+                                    <a:rPr lang="en-US" b="0" i="1" smtClean="0">
+                                      <a:latin typeface="Cambria Math" panose="02040503050406030204" pitchFamily="18" charset="0"/>
+                                    </a:rPr>
+                                    <m:t>0</m:t>
+                                  </m:r>
+                                </m:sub>
+                              </m:sSub>
+                              <m:r>
+                                <a:rPr lang="en-US" b="0" i="1" smtClean="0">
+                                  <a:latin typeface="Cambria Math" panose="02040503050406030204" pitchFamily="18" charset="0"/>
+                                </a:rPr>
+                                <m:t>+</m:t>
+                              </m:r>
+                              <m:sSub>
+                                <m:sSubPr>
+                                  <m:ctrlPr>
+                                    <a:rPr lang="en-US" b="0" i="1" smtClean="0">
+                                      <a:latin typeface="Cambria Math" panose="02040503050406030204" pitchFamily="18" charset="0"/>
+                                    </a:rPr>
+                                  </m:ctrlPr>
+                                </m:sSubPr>
+                                <m:e>
+                                  <m:r>
+                                    <a:rPr lang="en-US" b="0" i="1" smtClean="0">
+                                      <a:latin typeface="Cambria Math" panose="02040503050406030204" pitchFamily="18" charset="0"/>
+                                    </a:rPr>
+                                    <m:t>𝛽</m:t>
+                                  </m:r>
+                                </m:e>
+                                <m:sub>
+                                  <m:r>
+                                    <a:rPr lang="en-US" b="0" i="1" smtClean="0">
+                                      <a:latin typeface="Cambria Math" panose="02040503050406030204" pitchFamily="18" charset="0"/>
+                                    </a:rPr>
+                                    <m:t>1</m:t>
+                                  </m:r>
+                                </m:sub>
+                              </m:sSub>
+                              <m:sSub>
+                                <m:sSubPr>
+                                  <m:ctrlPr>
+                                    <a:rPr lang="en-US" b="0" i="1" smtClean="0">
+                                      <a:latin typeface="Cambria Math" panose="02040503050406030204" pitchFamily="18" charset="0"/>
+                                    </a:rPr>
+                                  </m:ctrlPr>
+                                </m:sSubPr>
+                                <m:e>
+                                  <m:r>
+                                    <a:rPr lang="en-US" b="0" i="1" smtClean="0">
+                                      <a:latin typeface="Cambria Math" panose="02040503050406030204" pitchFamily="18" charset="0"/>
+                                    </a:rPr>
+                                    <m:t>𝑥</m:t>
+                                  </m:r>
+                                </m:e>
+                                <m:sub>
+                                  <m:r>
+                                    <a:rPr lang="en-US" b="0" i="1" smtClean="0">
+                                      <a:latin typeface="Cambria Math" panose="02040503050406030204" pitchFamily="18" charset="0"/>
+                                    </a:rPr>
+                                    <m:t>1</m:t>
+                                  </m:r>
+                                </m:sub>
+                              </m:sSub>
+                              <m:r>
+                                <a:rPr lang="en-US" b="0" i="1" smtClean="0">
+                                  <a:latin typeface="Cambria Math" panose="02040503050406030204" pitchFamily="18" charset="0"/>
+                                </a:rPr>
+                                <m:t>+…</m:t>
+                              </m:r>
+                            </m:sup>
+                          </m:sSup>
+                        </m:den>
+                      </m:f>
+                    </m:oMath>
+                  </m:oMathPara>
+                </a14:m>
+                <a:endParaRPr lang="en-US" dirty="0"/>
+              </a:p>
+              <a:p>
+                <a:pPr>
+                  <a:lnSpc>
+                    <a:spcPct val="150000"/>
+                  </a:lnSpc>
+                </a:pPr>
+                <a:r>
+                  <a:rPr lang="en-US" dirty="0"/>
+                  <a:t>This is known as the “logit link function” (</a:t>
+                </a:r>
+                <a14:m>
+                  <m:oMath xmlns:m="http://schemas.openxmlformats.org/officeDocument/2006/math">
+                    <m:r>
+                      <m:rPr>
+                        <m:nor/>
+                      </m:rPr>
+                      <a:rPr lang="en-US" b="0" i="0" smtClean="0">
+                        <a:latin typeface="Cambria Math" panose="02040503050406030204" pitchFamily="18" charset="0"/>
+                      </a:rPr>
+                      <m:t>logit</m:t>
+                    </m:r>
+                    <m:r>
+                      <a:rPr lang="en-US" b="0" i="1" smtClean="0">
+                        <a:latin typeface="Cambria Math" panose="02040503050406030204" pitchFamily="18" charset="0"/>
+                      </a:rPr>
+                      <m:t>(</m:t>
+                    </m:r>
+                    <m:r>
+                      <a:rPr lang="en-US" b="0" i="1" smtClean="0">
+                        <a:latin typeface="Cambria Math" panose="02040503050406030204" pitchFamily="18" charset="0"/>
+                      </a:rPr>
+                      <m:t>𝑝</m:t>
+                    </m:r>
+                    <m:r>
+                      <a:rPr lang="en-US" b="0" i="1" smtClean="0">
+                        <a:latin typeface="Cambria Math" panose="02040503050406030204" pitchFamily="18" charset="0"/>
+                      </a:rPr>
+                      <m:t>)=</m:t>
+                    </m:r>
+                    <m:r>
+                      <m:rPr>
+                        <m:sty m:val="p"/>
+                      </m:rPr>
+                      <a:rPr lang="en-US" b="0" i="0" smtClean="0">
+                        <a:latin typeface="Cambria Math" panose="02040503050406030204" pitchFamily="18" charset="0"/>
+                      </a:rPr>
+                      <m:t>log</m:t>
+                    </m:r>
+                    <m:r>
+                      <a:rPr lang="en-US" b="0" i="1" smtClean="0">
+                        <a:latin typeface="Cambria Math" panose="02040503050406030204" pitchFamily="18" charset="0"/>
+                      </a:rPr>
+                      <m:t>⁡(</m:t>
+                    </m:r>
+                    <m:f>
+                      <m:fPr>
+                        <m:ctrlPr>
+                          <a:rPr lang="en-US" b="0" i="1" smtClean="0">
+                            <a:latin typeface="Cambria Math" panose="02040503050406030204" pitchFamily="18" charset="0"/>
+                          </a:rPr>
+                        </m:ctrlPr>
+                      </m:fPr>
+                      <m:num>
+                        <m:r>
+                          <a:rPr lang="en-US" b="0" i="1" smtClean="0">
+                            <a:latin typeface="Cambria Math" panose="02040503050406030204" pitchFamily="18" charset="0"/>
+                          </a:rPr>
+                          <m:t>𝑝</m:t>
+                        </m:r>
+                      </m:num>
+                      <m:den>
+                        <m:r>
+                          <a:rPr lang="en-US" b="0" i="1" smtClean="0">
+                            <a:latin typeface="Cambria Math" panose="02040503050406030204" pitchFamily="18" charset="0"/>
+                          </a:rPr>
+                          <m:t>1</m:t>
+                        </m:r>
+                        <m:r>
+                          <a:rPr lang="en-US" b="0" i="1" smtClean="0">
+                            <a:latin typeface="Cambria Math" panose="02040503050406030204" pitchFamily="18" charset="0"/>
+                          </a:rPr>
+                          <m:t>−</m:t>
+                        </m:r>
+                        <m:r>
+                          <a:rPr lang="en-US" b="0" i="1" smtClean="0">
+                            <a:latin typeface="Cambria Math" panose="02040503050406030204" pitchFamily="18" charset="0"/>
+                          </a:rPr>
+                          <m:t>𝑝</m:t>
+                        </m:r>
+                      </m:den>
+                    </m:f>
+                    <m:r>
+                      <a:rPr lang="en-US" b="0" i="1" smtClean="0">
+                        <a:latin typeface="Cambria Math" panose="02040503050406030204" pitchFamily="18" charset="0"/>
+                      </a:rPr>
+                      <m:t>)</m:t>
+                    </m:r>
+                  </m:oMath>
+                </a14:m>
+                <a:r>
+                  <a:rPr lang="en-US" dirty="0"/>
+                  <a:t> is linear)</a:t>
+                </a:r>
+              </a:p>
+              <a:p>
+                <a:pPr>
+                  <a:lnSpc>
+                    <a:spcPct val="150000"/>
+                  </a:lnSpc>
+                </a:pPr>
+                <a:r>
+                  <a:rPr lang="en-US" dirty="0"/>
+                  <a:t>Likelihood serves as our objective. It measures the extent to which the observed event is likely to happen under the model’s assumptions, i.e.:</a:t>
+                </a:r>
+              </a:p>
+              <a:p>
+                <a:pPr marL="0" indent="0">
+                  <a:lnSpc>
+                    <a:spcPct val="150000"/>
+                  </a:lnSpc>
+                  <a:buNone/>
+                </a:pPr>
+                <a14:m>
+                  <m:oMathPara xmlns:m="http://schemas.openxmlformats.org/officeDocument/2006/math">
+                    <m:oMathParaPr>
+                      <m:jc m:val="centerGroup"/>
+                    </m:oMathParaPr>
+                    <m:oMath xmlns:m="http://schemas.openxmlformats.org/officeDocument/2006/math">
+                      <m:r>
+                        <a:rPr lang="en-US" b="0" i="1" smtClean="0">
+                          <a:latin typeface="Cambria Math" panose="02040503050406030204" pitchFamily="18" charset="0"/>
+                        </a:rPr>
+                        <m:t>𝑙</m:t>
+                      </m:r>
+                      <m:d>
+                        <m:dPr>
+                          <m:ctrlPr>
+                            <a:rPr lang="en-US" b="0" i="1" smtClean="0">
+                              <a:latin typeface="Cambria Math" panose="02040503050406030204" pitchFamily="18" charset="0"/>
+                            </a:rPr>
+                          </m:ctrlPr>
+                        </m:dPr>
+                        <m:e>
+                          <m:r>
+                            <a:rPr lang="en-US" b="0" i="1" smtClean="0">
+                              <a:latin typeface="Cambria Math" panose="02040503050406030204" pitchFamily="18" charset="0"/>
+                            </a:rPr>
+                            <m:t>𝑋</m:t>
+                          </m:r>
+                        </m:e>
+                      </m:d>
+                      <m:r>
+                        <a:rPr lang="en-US" b="0" i="1" smtClean="0">
+                          <a:latin typeface="Cambria Math" panose="02040503050406030204" pitchFamily="18" charset="0"/>
+                        </a:rPr>
+                        <m:t>=</m:t>
+                      </m:r>
+                      <m:nary>
+                        <m:naryPr>
+                          <m:chr m:val="∏"/>
+                          <m:supHide m:val="on"/>
+                          <m:ctrlPr>
+                            <a:rPr lang="en-US" b="0" i="1" smtClean="0">
+                              <a:latin typeface="Cambria Math" panose="02040503050406030204" pitchFamily="18" charset="0"/>
+                            </a:rPr>
+                          </m:ctrlPr>
+                        </m:naryPr>
+                        <m:sub>
+                          <m:r>
+                            <m:rPr>
+                              <m:brk m:alnAt="7"/>
+                            </m:rPr>
+                            <a:rPr lang="en-US" b="0" i="1" smtClean="0">
+                              <a:latin typeface="Cambria Math" panose="02040503050406030204" pitchFamily="18" charset="0"/>
+                            </a:rPr>
+                            <m:t>𝑖</m:t>
+                          </m:r>
+                          <m:r>
+                            <a:rPr lang="en-US" b="0" i="1" smtClean="0">
+                              <a:latin typeface="Cambria Math" panose="02040503050406030204" pitchFamily="18" charset="0"/>
+                            </a:rPr>
+                            <m:t>:</m:t>
+                          </m:r>
+                          <m:sSub>
+                            <m:sSubPr>
+                              <m:ctrlPr>
+                                <a:rPr lang="en-US" b="0" i="1" smtClean="0">
+                                  <a:latin typeface="Cambria Math" panose="02040503050406030204" pitchFamily="18" charset="0"/>
+                                </a:rPr>
+                              </m:ctrlPr>
+                            </m:sSubPr>
+                            <m:e>
+                              <m:r>
+                                <m:rPr>
+                                  <m:brk m:alnAt="7"/>
+                                </m:rPr>
+                                <a:rPr lang="en-US" b="0" i="1" smtClean="0">
+                                  <a:latin typeface="Cambria Math" panose="02040503050406030204" pitchFamily="18" charset="0"/>
+                                </a:rPr>
+                                <m:t>𝑦</m:t>
+                              </m:r>
+                            </m:e>
+                            <m:sub>
+                              <m:r>
+                                <m:rPr>
+                                  <m:brk m:alnAt="7"/>
+                                </m:rPr>
+                                <a:rPr lang="en-US" b="0" i="1" smtClean="0">
+                                  <a:latin typeface="Cambria Math" panose="02040503050406030204" pitchFamily="18" charset="0"/>
+                                </a:rPr>
+                                <m:t>𝑖</m:t>
+                              </m:r>
+                            </m:sub>
+                          </m:sSub>
+                          <m:r>
+                            <m:rPr>
+                              <m:brk m:alnAt="7"/>
+                            </m:rPr>
+                            <a:rPr lang="en-US" b="0" i="1" smtClean="0">
+                              <a:latin typeface="Cambria Math" panose="02040503050406030204" pitchFamily="18" charset="0"/>
+                            </a:rPr>
+                            <m:t>=</m:t>
+                          </m:r>
+                          <m:r>
+                            <m:rPr>
+                              <m:brk m:alnAt="7"/>
+                            </m:rPr>
+                            <a:rPr lang="en-US" b="0" i="1" smtClean="0">
+                              <a:latin typeface="Cambria Math" panose="02040503050406030204" pitchFamily="18" charset="0"/>
+                            </a:rPr>
+                            <m:t>1</m:t>
+                          </m:r>
+                        </m:sub>
+                        <m:sup/>
+                        <m:e>
+                          <m:r>
+                            <a:rPr lang="en-US" b="0" i="1" smtClean="0">
+                              <a:latin typeface="Cambria Math" panose="02040503050406030204" pitchFamily="18" charset="0"/>
+                            </a:rPr>
+                            <m:t>𝑝</m:t>
+                          </m:r>
+                          <m:r>
+                            <a:rPr lang="en-US" b="0" i="1" smtClean="0">
+                              <a:latin typeface="Cambria Math" panose="02040503050406030204" pitchFamily="18" charset="0"/>
+                            </a:rPr>
+                            <m:t>(</m:t>
+                          </m:r>
+                          <m:sSub>
+                            <m:sSubPr>
+                              <m:ctrlPr>
+                                <a:rPr lang="en-US" b="0" i="1" smtClean="0">
+                                  <a:latin typeface="Cambria Math" panose="02040503050406030204" pitchFamily="18" charset="0"/>
+                                </a:rPr>
+                              </m:ctrlPr>
+                            </m:sSubPr>
+                            <m:e>
+                              <m:r>
+                                <a:rPr lang="en-US" b="0" i="1" smtClean="0">
+                                  <a:latin typeface="Cambria Math" panose="02040503050406030204" pitchFamily="18" charset="0"/>
+                                </a:rPr>
+                                <m:t>𝑥</m:t>
+                              </m:r>
+                            </m:e>
+                            <m:sub>
+                              <m:r>
+                                <a:rPr lang="en-US" b="0" i="1" smtClean="0">
+                                  <a:latin typeface="Cambria Math" panose="02040503050406030204" pitchFamily="18" charset="0"/>
+                                </a:rPr>
+                                <m:t>𝑖</m:t>
+                              </m:r>
+                            </m:sub>
+                          </m:sSub>
+                          <m:r>
+                            <a:rPr lang="en-US" b="0" i="1" smtClean="0">
+                              <a:latin typeface="Cambria Math" panose="02040503050406030204" pitchFamily="18" charset="0"/>
+                            </a:rPr>
+                            <m:t>)</m:t>
+                          </m:r>
+                        </m:e>
+                      </m:nary>
+                      <m:nary>
+                        <m:naryPr>
+                          <m:chr m:val="∏"/>
+                          <m:supHide m:val="on"/>
+                          <m:ctrlPr>
+                            <a:rPr lang="en-US" b="0" i="1" smtClean="0">
+                              <a:latin typeface="Cambria Math" panose="02040503050406030204" pitchFamily="18" charset="0"/>
+                            </a:rPr>
+                          </m:ctrlPr>
+                        </m:naryPr>
+                        <m:sub>
+                          <m:r>
+                            <a:rPr lang="en-US" b="0" i="1" smtClean="0">
+                              <a:latin typeface="Cambria Math" panose="02040503050406030204" pitchFamily="18" charset="0"/>
+                            </a:rPr>
+                            <m:t>𝑖</m:t>
+                          </m:r>
+                          <m:r>
+                            <a:rPr lang="en-US" b="0" i="1" smtClean="0">
+                              <a:latin typeface="Cambria Math" panose="02040503050406030204" pitchFamily="18" charset="0"/>
+                            </a:rPr>
+                            <m:t>:</m:t>
+                          </m:r>
+                          <m:sSub>
+                            <m:sSubPr>
+                              <m:ctrlPr>
+                                <a:rPr lang="en-US" b="0" i="1" smtClean="0">
+                                  <a:latin typeface="Cambria Math" panose="02040503050406030204" pitchFamily="18" charset="0"/>
+                                </a:rPr>
+                              </m:ctrlPr>
+                            </m:sSubPr>
+                            <m:e>
+                              <m:r>
+                                <a:rPr lang="en-US" b="0" i="1" smtClean="0">
+                                  <a:latin typeface="Cambria Math" panose="02040503050406030204" pitchFamily="18" charset="0"/>
+                                </a:rPr>
+                                <m:t>𝑦</m:t>
+                              </m:r>
+                            </m:e>
+                            <m:sub>
+                              <m:r>
+                                <a:rPr lang="en-US" b="0" i="1" smtClean="0">
+                                  <a:latin typeface="Cambria Math" panose="02040503050406030204" pitchFamily="18" charset="0"/>
+                                </a:rPr>
+                                <m:t>𝑖</m:t>
+                              </m:r>
+                            </m:sub>
+                          </m:sSub>
+                          <m:r>
+                            <a:rPr lang="en-US" b="0" i="1" smtClean="0">
+                              <a:latin typeface="Cambria Math" panose="02040503050406030204" pitchFamily="18" charset="0"/>
+                            </a:rPr>
+                            <m:t>=</m:t>
+                          </m:r>
+                          <m:r>
+                            <a:rPr lang="en-US" b="0" i="1" smtClean="0">
+                              <a:latin typeface="Cambria Math" panose="02040503050406030204" pitchFamily="18" charset="0"/>
+                            </a:rPr>
+                            <m:t>0</m:t>
+                          </m:r>
+                        </m:sub>
+                        <m:sup/>
+                        <m:e>
+                          <m:r>
+                            <a:rPr lang="en-US" b="0" i="1" smtClean="0">
+                              <a:latin typeface="Cambria Math" panose="02040503050406030204" pitchFamily="18" charset="0"/>
+                            </a:rPr>
+                            <m:t>1</m:t>
+                          </m:r>
+                          <m:r>
+                            <a:rPr lang="en-US" b="0" i="1" smtClean="0">
+                              <a:latin typeface="Cambria Math" panose="02040503050406030204" pitchFamily="18" charset="0"/>
+                            </a:rPr>
+                            <m:t>−</m:t>
+                          </m:r>
+                          <m:r>
+                            <a:rPr lang="en-US" b="0" i="1" smtClean="0">
+                              <a:latin typeface="Cambria Math" panose="02040503050406030204" pitchFamily="18" charset="0"/>
+                            </a:rPr>
+                            <m:t>𝑝</m:t>
+                          </m:r>
+                          <m:r>
+                            <a:rPr lang="en-US" b="0" i="1" smtClean="0">
+                              <a:latin typeface="Cambria Math" panose="02040503050406030204" pitchFamily="18" charset="0"/>
+                            </a:rPr>
+                            <m:t>(</m:t>
+                          </m:r>
+                          <m:sSub>
+                            <m:sSubPr>
+                              <m:ctrlPr>
+                                <a:rPr lang="en-US" b="0" i="1" smtClean="0">
+                                  <a:latin typeface="Cambria Math" panose="02040503050406030204" pitchFamily="18" charset="0"/>
+                                </a:rPr>
+                              </m:ctrlPr>
+                            </m:sSubPr>
+                            <m:e>
+                              <m:r>
+                                <a:rPr lang="en-US" b="0" i="1" smtClean="0">
+                                  <a:latin typeface="Cambria Math" panose="02040503050406030204" pitchFamily="18" charset="0"/>
+                                </a:rPr>
+                                <m:t>𝑥</m:t>
+                              </m:r>
+                            </m:e>
+                            <m:sub>
+                              <m:r>
+                                <a:rPr lang="en-US" b="0" i="1" smtClean="0">
+                                  <a:latin typeface="Cambria Math" panose="02040503050406030204" pitchFamily="18" charset="0"/>
+                                </a:rPr>
+                                <m:t>𝑖</m:t>
+                              </m:r>
+                            </m:sub>
+                          </m:sSub>
+                          <m:r>
+                            <a:rPr lang="en-US" b="0" i="1" smtClean="0">
+                              <a:latin typeface="Cambria Math" panose="02040503050406030204" pitchFamily="18" charset="0"/>
+                            </a:rPr>
+                            <m:t>)</m:t>
+                          </m:r>
+                        </m:e>
+                      </m:nary>
+                    </m:oMath>
+                  </m:oMathPara>
+                </a14:m>
+                <a:endParaRPr lang="en-US" dirty="0"/>
+              </a:p>
+            </p:txBody>
+          </p:sp>
+        </mc:Choice>
+        <mc:Fallback>
+          <p:sp>
+            <p:nvSpPr>
+              <p:cNvPr id="3" name="Content Placeholder 2">
+                <a:extLst>
+                  <a:ext uri="{FF2B5EF4-FFF2-40B4-BE49-F238E27FC236}">
+                    <a16:creationId xmlns:a16="http://schemas.microsoft.com/office/drawing/2014/main" id="{9DA995B1-110C-4833-A2FC-F96DC7D5A703}"/>
+                  </a:ext>
+                </a:extLst>
+              </p:cNvPr>
+              <p:cNvSpPr>
+                <a:spLocks noGrp="1" noRot="1" noChangeAspect="1" noMove="1" noResize="1" noEditPoints="1" noAdjustHandles="1" noChangeArrowheads="1" noChangeShapeType="1" noTextEdit="1"/>
+              </p:cNvSpPr>
+              <p:nvPr>
+                <p:ph idx="1"/>
+              </p:nvPr>
+            </p:nvSpPr>
+            <p:spPr>
+              <a:blipFill>
+                <a:blip r:embed="rId2"/>
+                <a:stretch>
+                  <a:fillRect l="-121"/>
+                </a:stretch>
+              </a:blipFill>
+            </p:spPr>
+            <p:txBody>
+              <a:bodyPr/>
+              <a:lstStyle/>
+              <a:p>
+                <a:r>
+                  <a:rPr lang="en-IL">
+                    <a:noFill/>
+                  </a:rPr>
+                  <a:t> </a:t>
+                </a:r>
+              </a:p>
+            </p:txBody>
+          </p:sp>
+        </mc:Fallback>
+      </mc:AlternateContent>
+      <p:sp>
+        <p:nvSpPr>
+          <p:cNvPr id="4" name="Footer Placeholder 3">
+            <a:extLst>
+              <a:ext uri="{FF2B5EF4-FFF2-40B4-BE49-F238E27FC236}">
+                <a16:creationId xmlns:a16="http://schemas.microsoft.com/office/drawing/2014/main" id="{644E927B-C0DC-4C85-9C78-CD5E09E17AE7}"/>
+              </a:ext>
+            </a:extLst>
+          </p:cNvPr>
+          <p:cNvSpPr>
+            <a:spLocks noGrp="1"/>
+          </p:cNvSpPr>
+          <p:nvPr>
+            <p:ph type="ftr" sz="quarter" idx="11"/>
+          </p:nvPr>
+        </p:nvSpPr>
+        <p:spPr/>
+        <p:txBody>
+          <a:bodyPr/>
+          <a:lstStyle/>
+          <a:p>
+            <a:r>
+              <a:rPr lang="en-US"/>
+              <a:t>Materials by Adi Sarid https://adisarid.github.io and http://www.sarid-ins.com</a:t>
+            </a:r>
+            <a:endParaRPr lang="en-US" dirty="0"/>
+          </a:p>
+        </p:txBody>
+      </p:sp>
+      <p:sp>
+        <p:nvSpPr>
+          <p:cNvPr id="5" name="Slide Number Placeholder 4">
+            <a:extLst>
+              <a:ext uri="{FF2B5EF4-FFF2-40B4-BE49-F238E27FC236}">
+                <a16:creationId xmlns:a16="http://schemas.microsoft.com/office/drawing/2014/main" id="{16DBECF7-D857-47CB-81CD-79C2BAF64F95}"/>
+              </a:ext>
+            </a:extLst>
+          </p:cNvPr>
+          <p:cNvSpPr>
+            <a:spLocks noGrp="1"/>
+          </p:cNvSpPr>
+          <p:nvPr>
+            <p:ph type="sldNum" sz="quarter" idx="12"/>
+          </p:nvPr>
+        </p:nvSpPr>
+        <p:spPr/>
+        <p:txBody>
+          <a:bodyPr/>
+          <a:lstStyle/>
+          <a:p>
+            <a:fld id="{4FAB73BC-B049-4115-A692-8D63A059BFB8}" type="slidenum">
+              <a:rPr lang="en-US" smtClean="0"/>
+              <a:t>5</a:t>
+            </a:fld>
+            <a:endParaRPr lang="en-US" dirty="0"/>
+          </a:p>
+        </p:txBody>
+      </p:sp>
+    </p:spTree>
+    <p:extLst>
+      <p:ext uri="{BB962C8B-B14F-4D97-AF65-F5344CB8AC3E}">
+        <p14:creationId xmlns:p14="http://schemas.microsoft.com/office/powerpoint/2010/main" val="4035659458"/>
+      </p:ext>
+    </p:extLst>
+  </p:cSld>
+  <p:clrMapOvr>
+    <a:masterClrMapping/>
+  </p:clrMapOvr>
+</p:sld>
+</file>
+
+<file path=ppt/slides/slide6.xml><?xml version="1.0" encoding="utf-8"?>
+<p:sld xmlns:a="http://schemas.openxmlformats.org/drawingml/2006/main" xmlns:r="http://schemas.openxmlformats.org/officeDocument/2006/relationships" xmlns:p="http://schemas.openxmlformats.org/presentationml/2006/main">
+  <p:cSld>
+    <p:spTree>
+      <p:nvGrpSpPr>
+        <p:cNvPr id="1" name=""/>
+        <p:cNvGrpSpPr/>
+        <p:nvPr/>
+      </p:nvGrpSpPr>
+      <p:grpSpPr>
+        <a:xfrm>
+          <a:off x="0" y="0"/>
+          <a:ext cx="0" cy="0"/>
+          <a:chOff x="0" y="0"/>
+          <a:chExt cx="0" cy="0"/>
+        </a:xfrm>
+      </p:grpSpPr>
+      <mc:AlternateContent xmlns:mc="http://schemas.openxmlformats.org/markup-compatibility/2006">
+        <mc:Choice xmlns:a14="http://schemas.microsoft.com/office/drawing/2010/main" Requires="a14">
+          <p:sp>
+            <p:nvSpPr>
+              <p:cNvPr id="2" name="Title 1">
+                <a:extLst>
+                  <a:ext uri="{FF2B5EF4-FFF2-40B4-BE49-F238E27FC236}">
+                    <a16:creationId xmlns:a16="http://schemas.microsoft.com/office/drawing/2014/main" id="{E7B8FC1D-4BF5-4834-ABE4-167D0748072F}"/>
+                  </a:ext>
+                </a:extLst>
+              </p:cNvPr>
+              <p:cNvSpPr>
+                <a:spLocks noGrp="1"/>
+              </p:cNvSpPr>
+              <p:nvPr>
+                <p:ph type="title"/>
+              </p:nvPr>
+            </p:nvSpPr>
+            <p:spPr/>
+            <p:txBody>
+              <a:bodyPr/>
+              <a:lstStyle/>
+              <a:p>
+                <a:r>
+                  <a:rPr lang="en-US" dirty="0"/>
+                  <a:t>Finding the optimal </a:t>
+                </a:r>
+                <a14:m>
+                  <m:oMath xmlns:m="http://schemas.openxmlformats.org/officeDocument/2006/math">
+                    <m:r>
+                      <a:rPr lang="en-US" b="1" i="1" smtClean="0">
+                        <a:latin typeface="Cambria Math" panose="02040503050406030204" pitchFamily="18" charset="0"/>
+                      </a:rPr>
+                      <m:t>𝜷</m:t>
+                    </m:r>
+                  </m:oMath>
+                </a14:m>
+                <a:endParaRPr lang="en-IL" dirty="0"/>
+              </a:p>
+            </p:txBody>
+          </p:sp>
+        </mc:Choice>
+        <mc:Fallback>
+          <p:sp>
+            <p:nvSpPr>
+              <p:cNvPr id="2" name="Title 1">
+                <a:extLst>
+                  <a:ext uri="{FF2B5EF4-FFF2-40B4-BE49-F238E27FC236}">
+                    <a16:creationId xmlns:a16="http://schemas.microsoft.com/office/drawing/2014/main" id="{E7B8FC1D-4BF5-4834-ABE4-167D0748072F}"/>
+                  </a:ext>
+                </a:extLst>
+              </p:cNvPr>
+              <p:cNvSpPr>
+                <a:spLocks noGrp="1" noRot="1" noChangeAspect="1" noMove="1" noResize="1" noEditPoints="1" noAdjustHandles="1" noChangeArrowheads="1" noChangeShapeType="1" noTextEdit="1"/>
+              </p:cNvSpPr>
+              <p:nvPr>
+                <p:ph type="title"/>
+              </p:nvPr>
+            </p:nvSpPr>
+            <p:spPr>
+              <a:blipFill>
+                <a:blip r:embed="rId2"/>
+                <a:stretch>
+                  <a:fillRect/>
+                </a:stretch>
+              </a:blipFill>
+            </p:spPr>
+            <p:txBody>
+              <a:bodyPr/>
+              <a:lstStyle/>
+              <a:p>
+                <a:r>
+                  <a:rPr lang="en-IL">
+                    <a:noFill/>
+                  </a:rPr>
+                  <a:t> </a:t>
+                </a:r>
+              </a:p>
+            </p:txBody>
+          </p:sp>
+        </mc:Fallback>
+      </mc:AlternateContent>
+      <p:sp>
+        <p:nvSpPr>
+          <p:cNvPr id="3" name="Content Placeholder 2">
+            <a:extLst>
+              <a:ext uri="{FF2B5EF4-FFF2-40B4-BE49-F238E27FC236}">
+                <a16:creationId xmlns:a16="http://schemas.microsoft.com/office/drawing/2014/main" id="{AB2A0A2C-CBBD-4347-BD7A-E09490B1C1D5}"/>
+              </a:ext>
+            </a:extLst>
+          </p:cNvPr>
+          <p:cNvSpPr>
+            <a:spLocks noGrp="1"/>
+          </p:cNvSpPr>
+          <p:nvPr>
+            <p:ph idx="1"/>
+          </p:nvPr>
+        </p:nvSpPr>
+        <p:spPr/>
+        <p:txBody>
+          <a:bodyPr/>
+          <a:lstStyle/>
+          <a:p>
+            <a:pPr>
+              <a:lnSpc>
+                <a:spcPct val="150000"/>
+              </a:lnSpc>
+            </a:pPr>
+            <a:r>
+              <a:rPr lang="en-US" dirty="0"/>
+              <a:t>In the linear regression case, we had a closed analytical form of the solution</a:t>
+            </a:r>
+          </a:p>
+          <a:p>
+            <a:pPr>
+              <a:lnSpc>
+                <a:spcPct val="150000"/>
+              </a:lnSpc>
+            </a:pPr>
+            <a:r>
+              <a:rPr lang="en-US" dirty="0"/>
+              <a:t>With logistic regression there is no closed analytical form to solve the max(log-likelihood), instead optimization algorithms such as Newton-Raphson are employed (see ESLII p.120-122)</a:t>
+            </a:r>
+          </a:p>
+          <a:p>
+            <a:pPr>
+              <a:lnSpc>
+                <a:spcPct val="150000"/>
+              </a:lnSpc>
+            </a:pPr>
+            <a:r>
+              <a:rPr lang="en-US" dirty="0"/>
+              <a:t>Logistic regression example:</a:t>
+            </a:r>
+          </a:p>
+          <a:p>
+            <a:pPr>
+              <a:lnSpc>
+                <a:spcPct val="150000"/>
+              </a:lnSpc>
+            </a:pPr>
+            <a:r>
+              <a:rPr lang="en-US" dirty="0"/>
+              <a:t>/class code/02-classification.Rmd</a:t>
+            </a:r>
+            <a:endParaRPr lang="en-IL" dirty="0"/>
+          </a:p>
+        </p:txBody>
+      </p:sp>
+      <p:sp>
+        <p:nvSpPr>
+          <p:cNvPr id="4" name="Footer Placeholder 3">
+            <a:extLst>
+              <a:ext uri="{FF2B5EF4-FFF2-40B4-BE49-F238E27FC236}">
+                <a16:creationId xmlns:a16="http://schemas.microsoft.com/office/drawing/2014/main" id="{022FFC62-C5BC-4777-81BF-BF3855F67BEE}"/>
+              </a:ext>
+            </a:extLst>
+          </p:cNvPr>
+          <p:cNvSpPr>
+            <a:spLocks noGrp="1"/>
+          </p:cNvSpPr>
+          <p:nvPr>
+            <p:ph type="ftr" sz="quarter" idx="11"/>
+          </p:nvPr>
+        </p:nvSpPr>
+        <p:spPr/>
+        <p:txBody>
+          <a:bodyPr/>
+          <a:lstStyle/>
+          <a:p>
+            <a:r>
+              <a:rPr lang="en-US"/>
+              <a:t>Materials by Adi Sarid https://adisarid.github.io and http://www.sarid-ins.com</a:t>
+            </a:r>
+            <a:endParaRPr lang="en-US" dirty="0"/>
+          </a:p>
+        </p:txBody>
+      </p:sp>
+      <p:sp>
+        <p:nvSpPr>
+          <p:cNvPr id="5" name="Slide Number Placeholder 4">
+            <a:extLst>
+              <a:ext uri="{FF2B5EF4-FFF2-40B4-BE49-F238E27FC236}">
+                <a16:creationId xmlns:a16="http://schemas.microsoft.com/office/drawing/2014/main" id="{25FC889D-7C4E-46EE-98E1-F7AEB2CD65CA}"/>
+              </a:ext>
+            </a:extLst>
+          </p:cNvPr>
+          <p:cNvSpPr>
+            <a:spLocks noGrp="1"/>
+          </p:cNvSpPr>
+          <p:nvPr>
+            <p:ph type="sldNum" sz="quarter" idx="12"/>
+          </p:nvPr>
+        </p:nvSpPr>
+        <p:spPr/>
+        <p:txBody>
+          <a:bodyPr/>
+          <a:lstStyle/>
+          <a:p>
+            <a:fld id="{4FAB73BC-B049-4115-A692-8D63A059BFB8}" type="slidenum">
+              <a:rPr lang="en-US" smtClean="0"/>
+              <a:t>6</a:t>
+            </a:fld>
+            <a:endParaRPr lang="en-US" dirty="0"/>
+          </a:p>
+        </p:txBody>
+      </p:sp>
+    </p:spTree>
+    <p:extLst>
+      <p:ext uri="{BB962C8B-B14F-4D97-AF65-F5344CB8AC3E}">
+        <p14:creationId xmlns:p14="http://schemas.microsoft.com/office/powerpoint/2010/main" val="2395515843"/>
+      </p:ext>
+    </p:extLst>
+  </p:cSld>
+  <p:clrMapOvr>
+    <a:masterClrMapping/>
+  </p:clrMapOvr>
+</p:sld>
+</file>
+
+<file path=ppt/slides/slide7.xml><?xml version="1.0" encoding="utf-8"?>
+<p:sld xmlns:a="http://schemas.openxmlformats.org/drawingml/2006/main" xmlns:r="http://schemas.openxmlformats.org/officeDocument/2006/relationships" xmlns:p="http://schemas.openxmlformats.org/presentationml/2006/main">
+  <p:cSld>
+    <p:spTree>
+      <p:nvGrpSpPr>
+        <p:cNvPr id="1" name=""/>
+        <p:cNvGrpSpPr/>
+        <p:nvPr/>
+      </p:nvGrpSpPr>
+      <p:grpSpPr>
+        <a:xfrm>
+          <a:off x="0" y="0"/>
+          <a:ext cx="0" cy="0"/>
+          <a:chOff x="0" y="0"/>
+          <a:chExt cx="0" cy="0"/>
+        </a:xfrm>
+      </p:grpSpPr>
+      <p:sp>
+        <p:nvSpPr>
+          <p:cNvPr id="2" name="Title 1">
+            <a:extLst>
+              <a:ext uri="{FF2B5EF4-FFF2-40B4-BE49-F238E27FC236}">
+                <a16:creationId xmlns:a16="http://schemas.microsoft.com/office/drawing/2014/main" id="{4DAEAB71-592E-43C6-A6CB-73CB74CB35EE}"/>
+              </a:ext>
+            </a:extLst>
+          </p:cNvPr>
+          <p:cNvSpPr>
+            <a:spLocks noGrp="1"/>
+          </p:cNvSpPr>
+          <p:nvPr>
+            <p:ph type="title"/>
+          </p:nvPr>
+        </p:nvSpPr>
+        <p:spPr/>
+        <p:txBody>
+          <a:bodyPr/>
+          <a:lstStyle/>
+          <a:p>
+            <a:endParaRPr lang="en-IL" dirty="0"/>
+          </a:p>
+        </p:txBody>
+      </p:sp>
+      <p:sp>
+        <p:nvSpPr>
+          <p:cNvPr id="3" name="Content Placeholder 2">
+            <a:extLst>
+              <a:ext uri="{FF2B5EF4-FFF2-40B4-BE49-F238E27FC236}">
+                <a16:creationId xmlns:a16="http://schemas.microsoft.com/office/drawing/2014/main" id="{6B810815-FEFC-4585-BA34-B4D96C334446}"/>
+              </a:ext>
+            </a:extLst>
+          </p:cNvPr>
+          <p:cNvSpPr>
+            <a:spLocks noGrp="1"/>
+          </p:cNvSpPr>
+          <p:nvPr>
+            <p:ph idx="1"/>
+          </p:nvPr>
+        </p:nvSpPr>
+        <p:spPr/>
+        <p:txBody>
+          <a:bodyPr/>
+          <a:lstStyle/>
+          <a:p>
+            <a:endParaRPr lang="en-IL"/>
+          </a:p>
+        </p:txBody>
+      </p:sp>
+      <p:sp>
+        <p:nvSpPr>
+          <p:cNvPr id="4" name="Footer Placeholder 3">
+            <a:extLst>
+              <a:ext uri="{FF2B5EF4-FFF2-40B4-BE49-F238E27FC236}">
+                <a16:creationId xmlns:a16="http://schemas.microsoft.com/office/drawing/2014/main" id="{B5AA9B70-9C48-4DEB-86FD-BC480DC6B4CA}"/>
+              </a:ext>
+            </a:extLst>
+          </p:cNvPr>
+          <p:cNvSpPr>
+            <a:spLocks noGrp="1"/>
+          </p:cNvSpPr>
+          <p:nvPr>
+            <p:ph type="ftr" sz="quarter" idx="11"/>
+          </p:nvPr>
+        </p:nvSpPr>
+        <p:spPr/>
+        <p:txBody>
+          <a:bodyPr/>
+          <a:lstStyle/>
+          <a:p>
+            <a:r>
+              <a:rPr lang="en-US"/>
+              <a:t>Materials by Adi Sarid https://adisarid.github.io and http://www.sarid-ins.com</a:t>
+            </a:r>
+            <a:endParaRPr lang="en-US" dirty="0"/>
+          </a:p>
+        </p:txBody>
+      </p:sp>
+      <p:sp>
+        <p:nvSpPr>
+          <p:cNvPr id="5" name="Slide Number Placeholder 4">
+            <a:extLst>
+              <a:ext uri="{FF2B5EF4-FFF2-40B4-BE49-F238E27FC236}">
+                <a16:creationId xmlns:a16="http://schemas.microsoft.com/office/drawing/2014/main" id="{CC3D6CF1-E4B7-4764-9D3D-081E38A15162}"/>
+              </a:ext>
+            </a:extLst>
+          </p:cNvPr>
+          <p:cNvSpPr>
+            <a:spLocks noGrp="1"/>
+          </p:cNvSpPr>
+          <p:nvPr>
+            <p:ph type="sldNum" sz="quarter" idx="12"/>
+          </p:nvPr>
+        </p:nvSpPr>
+        <p:spPr/>
+        <p:txBody>
+          <a:bodyPr/>
+          <a:lstStyle/>
+          <a:p>
+            <a:fld id="{4FAB73BC-B049-4115-A692-8D63A059BFB8}" type="slidenum">
+              <a:rPr lang="en-US" smtClean="0"/>
+              <a:t>7</a:t>
+            </a:fld>
+            <a:endParaRPr lang="en-US" dirty="0"/>
+          </a:p>
+        </p:txBody>
+      </p:sp>
+    </p:spTree>
+    <p:extLst>
+      <p:ext uri="{BB962C8B-B14F-4D97-AF65-F5344CB8AC3E}">
+        <p14:creationId xmlns:p14="http://schemas.microsoft.com/office/powerpoint/2010/main" val="4146964617"/>
       </p:ext>
     </p:extLst>
   </p:cSld>

</xml_diff>